<commit_message>
Remove outdated German presentation slides; update and add new architecture diagrams
- Removed outdated German presentation slides, focusing on current and relevant content.
- Added and updated architecture diagrams using draw.io for enhanced clarity and understanding.
- Committed new presentation slides emphasizing AI-assisted development methodologies.
</commit_message>
<xml_diff>
--- a/doc/ai/presentation/generated/SoftwareDevelopmentWithAI.pptx
+++ b/doc/ai/presentation/generated/SoftwareDevelopmentWithAI.pptx
@@ -1,11 +1,11 @@
 
 <file path=ppt/presentation.xml><?xml version="1.0" encoding="utf-8"?>
-<p:presentation xmlns:a="http://schemas.openxmlformats.org/drawingml/2006/main" xmlns:p="http://schemas.openxmlformats.org/presentationml/2006/main" xmlns:r="http://schemas.openxmlformats.org/officeDocument/2006/relationships" saveSubsetFonts="1">
+<p:presentation xmlns:a="http://schemas.openxmlformats.org/drawingml/2006/main" xmlns:r="http://schemas.openxmlformats.org/officeDocument/2006/relationships" xmlns:p="http://schemas.openxmlformats.org/presentationml/2006/main" saveSubsetFonts="1">
   <p:sldMasterIdLst>
     <p:sldMasterId id="2147483648" r:id="rId1"/>
   </p:sldMasterIdLst>
   <p:notesMasterIdLst>
-    <p:notesMasterId r:id="rId15"/>
+    <p:notesMasterId r:id="rId14"/>
   </p:notesMasterIdLst>
   <p:sldIdLst>
     <p:sldId id="256" r:id="rId2"/>
@@ -20,7 +20,6 @@
     <p:sldId id="265" r:id="rId11"/>
     <p:sldId id="266" r:id="rId12"/>
     <p:sldId id="267" r:id="rId13"/>
-    <p:sldId id="268" r:id="rId14"/>
   </p:sldIdLst>
   <p:sldSz cx="12192000" cy="6858000"/>
   <p:notesSz cx="6858000" cy="9144000"/>
@@ -28,8 +27,8 @@
     <a:defPPr>
       <a:defRPr lang="de-DE"/>
     </a:defPPr>
-    <a:lvl1pPr algn="l" defTabSz="914400" eaLnBrk="1" hangingPunct="1" latinLnBrk="0" marL="0" rtl="0">
-      <a:defRPr kern="1200" sz="1800">
+    <a:lvl1pPr marL="0" algn="l" defTabSz="914400" rtl="0" eaLnBrk="1" latinLnBrk="0" hangingPunct="1">
+      <a:defRPr sz="1800" kern="1200">
         <a:solidFill>
           <a:schemeClr val="tx1"/>
         </a:solidFill>
@@ -38,8 +37,8 @@
         <a:cs typeface="+mn-cs"/>
       </a:defRPr>
     </a:lvl1pPr>
-    <a:lvl2pPr algn="l" defTabSz="914400" eaLnBrk="1" hangingPunct="1" latinLnBrk="0" marL="457200" rtl="0">
-      <a:defRPr kern="1200" sz="1800">
+    <a:lvl2pPr marL="457200" algn="l" defTabSz="914400" rtl="0" eaLnBrk="1" latinLnBrk="0" hangingPunct="1">
+      <a:defRPr sz="1800" kern="1200">
         <a:solidFill>
           <a:schemeClr val="tx1"/>
         </a:solidFill>
@@ -48,8 +47,8 @@
         <a:cs typeface="+mn-cs"/>
       </a:defRPr>
     </a:lvl2pPr>
-    <a:lvl3pPr algn="l" defTabSz="914400" eaLnBrk="1" hangingPunct="1" latinLnBrk="0" marL="914400" rtl="0">
-      <a:defRPr kern="1200" sz="1800">
+    <a:lvl3pPr marL="914400" algn="l" defTabSz="914400" rtl="0" eaLnBrk="1" latinLnBrk="0" hangingPunct="1">
+      <a:defRPr sz="1800" kern="1200">
         <a:solidFill>
           <a:schemeClr val="tx1"/>
         </a:solidFill>
@@ -58,8 +57,8 @@
         <a:cs typeface="+mn-cs"/>
       </a:defRPr>
     </a:lvl3pPr>
-    <a:lvl4pPr algn="l" defTabSz="914400" eaLnBrk="1" hangingPunct="1" latinLnBrk="0" marL="1371600" rtl="0">
-      <a:defRPr kern="1200" sz="1800">
+    <a:lvl4pPr marL="1371600" algn="l" defTabSz="914400" rtl="0" eaLnBrk="1" latinLnBrk="0" hangingPunct="1">
+      <a:defRPr sz="1800" kern="1200">
         <a:solidFill>
           <a:schemeClr val="tx1"/>
         </a:solidFill>
@@ -68,8 +67,8 @@
         <a:cs typeface="+mn-cs"/>
       </a:defRPr>
     </a:lvl4pPr>
-    <a:lvl5pPr algn="l" defTabSz="914400" eaLnBrk="1" hangingPunct="1" latinLnBrk="0" marL="1828800" rtl="0">
-      <a:defRPr kern="1200" sz="1800">
+    <a:lvl5pPr marL="1828800" algn="l" defTabSz="914400" rtl="0" eaLnBrk="1" latinLnBrk="0" hangingPunct="1">
+      <a:defRPr sz="1800" kern="1200">
         <a:solidFill>
           <a:schemeClr val="tx1"/>
         </a:solidFill>
@@ -78,8 +77,8 @@
         <a:cs typeface="+mn-cs"/>
       </a:defRPr>
     </a:lvl5pPr>
-    <a:lvl6pPr algn="l" defTabSz="914400" eaLnBrk="1" hangingPunct="1" latinLnBrk="0" marL="2286000" rtl="0">
-      <a:defRPr kern="1200" sz="1800">
+    <a:lvl6pPr marL="2286000" algn="l" defTabSz="914400" rtl="0" eaLnBrk="1" latinLnBrk="0" hangingPunct="1">
+      <a:defRPr sz="1800" kern="1200">
         <a:solidFill>
           <a:schemeClr val="tx1"/>
         </a:solidFill>
@@ -88,8 +87,8 @@
         <a:cs typeface="+mn-cs"/>
       </a:defRPr>
     </a:lvl6pPr>
-    <a:lvl7pPr algn="l" defTabSz="914400" eaLnBrk="1" hangingPunct="1" latinLnBrk="0" marL="2743200" rtl="0">
-      <a:defRPr kern="1200" sz="1800">
+    <a:lvl7pPr marL="2743200" algn="l" defTabSz="914400" rtl="0" eaLnBrk="1" latinLnBrk="0" hangingPunct="1">
+      <a:defRPr sz="1800" kern="1200">
         <a:solidFill>
           <a:schemeClr val="tx1"/>
         </a:solidFill>
@@ -98,8 +97,8 @@
         <a:cs typeface="+mn-cs"/>
       </a:defRPr>
     </a:lvl7pPr>
-    <a:lvl8pPr algn="l" defTabSz="914400" eaLnBrk="1" hangingPunct="1" latinLnBrk="0" marL="3200400" rtl="0">
-      <a:defRPr kern="1200" sz="1800">
+    <a:lvl8pPr marL="3200400" algn="l" defTabSz="914400" rtl="0" eaLnBrk="1" latinLnBrk="0" hangingPunct="1">
+      <a:defRPr sz="1800" kern="1200">
         <a:solidFill>
           <a:schemeClr val="tx1"/>
         </a:solidFill>
@@ -108,8 +107,8 @@
         <a:cs typeface="+mn-cs"/>
       </a:defRPr>
     </a:lvl8pPr>
-    <a:lvl9pPr algn="l" defTabSz="914400" eaLnBrk="1" hangingPunct="1" latinLnBrk="0" marL="3657600" rtl="0">
-      <a:defRPr kern="1200" sz="1800">
+    <a:lvl9pPr marL="3657600" algn="l" defTabSz="914400" rtl="0" eaLnBrk="1" latinLnBrk="0" hangingPunct="1">
+      <a:defRPr sz="1800" kern="1200">
         <a:solidFill>
           <a:schemeClr val="tx1"/>
         </a:solidFill>
@@ -209,7 +208,7 @@
           <a:p>
             <a:fld id="{8993A166-1F31-487E-8A46-D11B4D0E59FD}" type="datetimeFigureOut">
               <a:rPr lang="de-DE" smtClean="0"/>
-              <a:t>11.01.2026</a:t>
+              <a:t>13.01.2026</a:t>
             </a:fld>
             <a:endParaRPr lang="de-DE"/>
           </a:p>
@@ -521,12 +520,11 @@
           <a:bodyPr/>
           <a:lstStyle/>
           <a:p>
-            <a:pPr lvl="0" indent="0" marL="0">
-              <a:buNone/>
-            </a:pPr>
-            <a:r>
-              <a:rPr/>
-              <a:t>Gefolgt von Online-Demo</a:t>
+            <a:pPr marL="0" lvl="0" indent="0">
+              <a:buNone/>
+            </a:pPr>
+            <a:r>
+              <a:t>Kurze Übersicht über den Ablauf der Präsentation. Ziel ist es, erst Kontext und Demo zu zeigen, dann die eingesetzten AI-Werkzeuge zu erklären und zum Schluss Erfahrungen und eine Einordnung zu geben.</a:t>
             </a:r>
           </a:p>
         </p:txBody>
@@ -548,7 +546,7 @@
           <a:p>
             <a:fld id="{CE7B3DDE-D4F3-48A2-A1E3-A61CF778A29A}" type="slidenum">
               <a:rPr lang="en-US"/>
-              <a:t>7</a:t>
+              <a:t>2</a:t>
             </a:fld>
             <a:endParaRPr lang="en-US"/>
           </a:p>
@@ -556,12 +554,15 @@
       </p:sp>
     </p:spTree>
   </p:cSld>
+  <p:clrMapOvr>
+    <a:masterClrMapping/>
+  </p:clrMapOvr>
 </p:notes>
 </file>
 
-<file path=ppt/slideLayouts/slideLayout1.xml><?xml version="1.0" encoding="utf-8"?>
-<p:sldLayout xmlns:a="http://schemas.openxmlformats.org/drawingml/2006/main" xmlns:r="http://schemas.openxmlformats.org/officeDocument/2006/relationships" xmlns:p="http://schemas.openxmlformats.org/presentationml/2006/main" type="title" preserve="1">
-  <p:cSld name="Title Slide">
+<file path=ppt/notesSlides/notesSlide2.xml><?xml version="1.0" encoding="utf-8"?>
+<p:notes xmlns:a="http://schemas.openxmlformats.org/drawingml/2006/main" xmlns:r="http://schemas.openxmlformats.org/officeDocument/2006/relationships" xmlns:p="http://schemas.openxmlformats.org/presentationml/2006/main">
+  <p:cSld>
     <p:spTree>
       <p:nvGrpSpPr>
         <p:cNvPr id="1" name=""/>
@@ -578,6 +579,720 @@
       </p:grpSpPr>
       <p:sp>
         <p:nvSpPr>
+          <p:cNvPr id="2" name="Slide Image Placeholder 1"/>
+          <p:cNvSpPr>
+            <a:spLocks noGrp="1" noRot="1" noChangeAspect="1"/>
+          </p:cNvSpPr>
+          <p:nvPr>
+            <p:ph type="sldImg"/>
+          </p:nvPr>
+        </p:nvSpPr>
+        <p:spPr/>
+      </p:sp>
+      <p:sp>
+        <p:nvSpPr>
+          <p:cNvPr id="3" name="Notes Placeholder 2"/>
+          <p:cNvSpPr>
+            <a:spLocks noGrp="1"/>
+          </p:cNvSpPr>
+          <p:nvPr>
+            <p:ph type="body" idx="1"/>
+          </p:nvPr>
+        </p:nvSpPr>
+        <p:spPr/>
+        <p:txBody>
+          <a:bodyPr/>
+          <a:lstStyle/>
+          <a:p>
+            <a:pPr marL="0" lvl="0" indent="0">
+              <a:buNone/>
+            </a:pPr>
+            <a:r>
+              <a:t>Die gleiche Anwendung existiert als Web- und als Android-App. Beide greifen auf dasselbe Backend zu. Das ist wichtig, weil AI-Unterstützung über alle Ebenen hinweg genutzt wurde.</a:t>
+            </a:r>
+          </a:p>
+        </p:txBody>
+      </p:sp>
+      <p:sp>
+        <p:nvSpPr>
+          <p:cNvPr id="4" name="Slide Number Placeholder 3"/>
+          <p:cNvSpPr>
+            <a:spLocks noGrp="1"/>
+          </p:cNvSpPr>
+          <p:nvPr>
+            <p:ph type="sldNum" sz="quarter" idx="10"/>
+          </p:nvPr>
+        </p:nvSpPr>
+        <p:spPr/>
+        <p:txBody>
+          <a:bodyPr/>
+          <a:lstStyle/>
+          <a:p>
+            <a:fld id="{CE7B3DDE-D4F3-48A2-A1E3-A61CF778A29A}" type="slidenum">
+              <a:rPr lang="en-US"/>
+              <a:t>3</a:t>
+            </a:fld>
+            <a:endParaRPr lang="en-US"/>
+          </a:p>
+        </p:txBody>
+      </p:sp>
+    </p:spTree>
+  </p:cSld>
+  <p:clrMapOvr>
+    <a:masterClrMapping/>
+  </p:clrMapOvr>
+</p:notes>
+</file>
+
+<file path=ppt/notesSlides/notesSlide3.xml><?xml version="1.0" encoding="utf-8"?>
+<p:notes xmlns:a="http://schemas.openxmlformats.org/drawingml/2006/main" xmlns:r="http://schemas.openxmlformats.org/officeDocument/2006/relationships" xmlns:p="http://schemas.openxmlformats.org/presentationml/2006/main">
+  <p:cSld>
+    <p:spTree>
+      <p:nvGrpSpPr>
+        <p:cNvPr id="1" name=""/>
+        <p:cNvGrpSpPr/>
+        <p:nvPr/>
+      </p:nvGrpSpPr>
+      <p:grpSpPr>
+        <a:xfrm>
+          <a:off x="0" y="0"/>
+          <a:ext cx="0" cy="0"/>
+          <a:chOff x="0" y="0"/>
+          <a:chExt cx="0" cy="0"/>
+        </a:xfrm>
+      </p:grpSpPr>
+      <p:sp>
+        <p:nvSpPr>
+          <p:cNvPr id="2" name="Slide Image Placeholder 1"/>
+          <p:cNvSpPr>
+            <a:spLocks noGrp="1" noRot="1" noChangeAspect="1"/>
+          </p:cNvSpPr>
+          <p:nvPr>
+            <p:ph type="sldImg"/>
+          </p:nvPr>
+        </p:nvSpPr>
+        <p:spPr/>
+      </p:sp>
+      <p:sp>
+        <p:nvSpPr>
+          <p:cNvPr id="3" name="Notes Placeholder 2"/>
+          <p:cNvSpPr>
+            <a:spLocks noGrp="1"/>
+          </p:cNvSpPr>
+          <p:nvPr>
+            <p:ph type="body" idx="1"/>
+          </p:nvPr>
+        </p:nvSpPr>
+        <p:spPr/>
+        <p:txBody>
+          <a:bodyPr/>
+          <a:lstStyle/>
+          <a:p>
+            <a:pPr marL="0" lvl="0" indent="0">
+              <a:buNone/>
+            </a:pPr>
+            <a:r>
+              <a:t>Hier sehen wir die logische Architektur. Mehrere Clients greifen auf eine gemeinsame REST-API zu. Die Persistenz ist produktiv PostgreSQL, lokal wird H2 für Entwicklung und Tests genutzt.</a:t>
+            </a:r>
+          </a:p>
+          <a:p>
+            <a:pPr marL="0" lvl="0" indent="0">
+              <a:buNone/>
+            </a:pPr>
+            <a:endParaRPr/>
+          </a:p>
+          <a:p>
+            <a:pPr marL="0" lvl="0" indent="0">
+              <a:buNone/>
+            </a:pPr>
+            <a:r>
+              <a:t>Die Anwendung läuft containerisiert in AWS. Docker ermöglicht reproduzierbare Builds, ECS Fargate reduziert operativen Aufwand. Nach dieser Folie folgt die Live-Demo.</a:t>
+            </a:r>
+          </a:p>
+        </p:txBody>
+      </p:sp>
+      <p:sp>
+        <p:nvSpPr>
+          <p:cNvPr id="4" name="Slide Number Placeholder 3"/>
+          <p:cNvSpPr>
+            <a:spLocks noGrp="1"/>
+          </p:cNvSpPr>
+          <p:nvPr>
+            <p:ph type="sldNum" sz="quarter" idx="10"/>
+          </p:nvPr>
+        </p:nvSpPr>
+        <p:spPr/>
+        <p:txBody>
+          <a:bodyPr/>
+          <a:lstStyle/>
+          <a:p>
+            <a:fld id="{CE7B3DDE-D4F3-48A2-A1E3-A61CF778A29A}" type="slidenum">
+              <a:rPr lang="en-US"/>
+              <a:t>6</a:t>
+            </a:fld>
+            <a:endParaRPr lang="en-US"/>
+          </a:p>
+        </p:txBody>
+      </p:sp>
+    </p:spTree>
+  </p:cSld>
+  <p:clrMapOvr>
+    <a:masterClrMapping/>
+  </p:clrMapOvr>
+</p:notes>
+</file>
+
+<file path=ppt/notesSlides/notesSlide4.xml><?xml version="1.0" encoding="utf-8"?>
+<p:notes xmlns:a="http://schemas.openxmlformats.org/drawingml/2006/main" xmlns:r="http://schemas.openxmlformats.org/officeDocument/2006/relationships" xmlns:p="http://schemas.openxmlformats.org/presentationml/2006/main">
+  <p:cSld>
+    <p:spTree>
+      <p:nvGrpSpPr>
+        <p:cNvPr id="1" name=""/>
+        <p:cNvGrpSpPr/>
+        <p:nvPr/>
+      </p:nvGrpSpPr>
+      <p:grpSpPr>
+        <a:xfrm>
+          <a:off x="0" y="0"/>
+          <a:ext cx="0" cy="0"/>
+          <a:chOff x="0" y="0"/>
+          <a:chExt cx="0" cy="0"/>
+        </a:xfrm>
+      </p:grpSpPr>
+      <p:sp>
+        <p:nvSpPr>
+          <p:cNvPr id="2" name="Slide Image Placeholder 1"/>
+          <p:cNvSpPr>
+            <a:spLocks noGrp="1" noRot="1" noChangeAspect="1"/>
+          </p:cNvSpPr>
+          <p:nvPr>
+            <p:ph type="sldImg"/>
+          </p:nvPr>
+        </p:nvSpPr>
+        <p:spPr/>
+      </p:sp>
+      <p:sp>
+        <p:nvSpPr>
+          <p:cNvPr id="3" name="Notes Placeholder 2"/>
+          <p:cNvSpPr>
+            <a:spLocks noGrp="1"/>
+          </p:cNvSpPr>
+          <p:nvPr>
+            <p:ph type="body" idx="1"/>
+          </p:nvPr>
+        </p:nvSpPr>
+        <p:spPr/>
+        <p:txBody>
+          <a:bodyPr/>
+          <a:lstStyle/>
+          <a:p>
+            <a:pPr marL="0" lvl="0" indent="0">
+              <a:buNone/>
+            </a:pPr>
+            <a:r>
+              <a:t>Wir nutzen nicht ein einzelnes Tool, sondern eine Kombination. Junie ist stark in der direkten Code-Arbeit in der IDE, ChatGPT unterstützt eher konzeptionell und bei Reviews.</a:t>
+            </a:r>
+          </a:p>
+        </p:txBody>
+      </p:sp>
+      <p:sp>
+        <p:nvSpPr>
+          <p:cNvPr id="4" name="Slide Number Placeholder 3"/>
+          <p:cNvSpPr>
+            <a:spLocks noGrp="1"/>
+          </p:cNvSpPr>
+          <p:nvPr>
+            <p:ph type="sldNum" sz="quarter" idx="10"/>
+          </p:nvPr>
+        </p:nvSpPr>
+        <p:spPr/>
+        <p:txBody>
+          <a:bodyPr/>
+          <a:lstStyle/>
+          <a:p>
+            <a:fld id="{CE7B3DDE-D4F3-48A2-A1E3-A61CF778A29A}" type="slidenum">
+              <a:rPr lang="en-US"/>
+              <a:t>7</a:t>
+            </a:fld>
+            <a:endParaRPr lang="en-US"/>
+          </a:p>
+        </p:txBody>
+      </p:sp>
+    </p:spTree>
+  </p:cSld>
+  <p:clrMapOvr>
+    <a:masterClrMapping/>
+  </p:clrMapOvr>
+</p:notes>
+</file>
+
+<file path=ppt/notesSlides/notesSlide5.xml><?xml version="1.0" encoding="utf-8"?>
+<p:notes xmlns:a="http://schemas.openxmlformats.org/drawingml/2006/main" xmlns:r="http://schemas.openxmlformats.org/officeDocument/2006/relationships" xmlns:p="http://schemas.openxmlformats.org/presentationml/2006/main">
+  <p:cSld>
+    <p:spTree>
+      <p:nvGrpSpPr>
+        <p:cNvPr id="1" name=""/>
+        <p:cNvGrpSpPr/>
+        <p:nvPr/>
+      </p:nvGrpSpPr>
+      <p:grpSpPr>
+        <a:xfrm>
+          <a:off x="0" y="0"/>
+          <a:ext cx="0" cy="0"/>
+          <a:chOff x="0" y="0"/>
+          <a:chExt cx="0" cy="0"/>
+        </a:xfrm>
+      </p:grpSpPr>
+      <p:sp>
+        <p:nvSpPr>
+          <p:cNvPr id="2" name="Slide Image Placeholder 1"/>
+          <p:cNvSpPr>
+            <a:spLocks noGrp="1" noRot="1" noChangeAspect="1"/>
+          </p:cNvSpPr>
+          <p:nvPr>
+            <p:ph type="sldImg"/>
+          </p:nvPr>
+        </p:nvSpPr>
+        <p:spPr/>
+      </p:sp>
+      <p:sp>
+        <p:nvSpPr>
+          <p:cNvPr id="3" name="Notes Placeholder 2"/>
+          <p:cNvSpPr>
+            <a:spLocks noGrp="1"/>
+          </p:cNvSpPr>
+          <p:nvPr>
+            <p:ph type="body" idx="1"/>
+          </p:nvPr>
+        </p:nvSpPr>
+        <p:spPr/>
+        <p:txBody>
+          <a:bodyPr/>
+          <a:lstStyle/>
+          <a:p>
+            <a:pPr marL="0" lvl="0" indent="0">
+              <a:buNone/>
+            </a:pPr>
+            <a:r>
+              <a:t>Wichtig ist ein strukturierter Ablauf. AI arbeitet nicht „magisch“, sondern folgt klaren Vorgaben. Der Entwickler bleibt jederzeit verantwortlich und prüft die Ergebnisse kritisch.</a:t>
+            </a:r>
+          </a:p>
+        </p:txBody>
+      </p:sp>
+      <p:sp>
+        <p:nvSpPr>
+          <p:cNvPr id="4" name="Slide Number Placeholder 3"/>
+          <p:cNvSpPr>
+            <a:spLocks noGrp="1"/>
+          </p:cNvSpPr>
+          <p:nvPr>
+            <p:ph type="sldNum" sz="quarter" idx="10"/>
+          </p:nvPr>
+        </p:nvSpPr>
+        <p:spPr/>
+        <p:txBody>
+          <a:bodyPr/>
+          <a:lstStyle/>
+          <a:p>
+            <a:fld id="{CE7B3DDE-D4F3-48A2-A1E3-A61CF778A29A}" type="slidenum">
+              <a:rPr lang="en-US"/>
+              <a:t>8</a:t>
+            </a:fld>
+            <a:endParaRPr lang="en-US"/>
+          </a:p>
+        </p:txBody>
+      </p:sp>
+    </p:spTree>
+  </p:cSld>
+  <p:clrMapOvr>
+    <a:masterClrMapping/>
+  </p:clrMapOvr>
+</p:notes>
+</file>
+
+<file path=ppt/notesSlides/notesSlide6.xml><?xml version="1.0" encoding="utf-8"?>
+<p:notes xmlns:a="http://schemas.openxmlformats.org/drawingml/2006/main" xmlns:r="http://schemas.openxmlformats.org/officeDocument/2006/relationships" xmlns:p="http://schemas.openxmlformats.org/presentationml/2006/main">
+  <p:cSld>
+    <p:spTree>
+      <p:nvGrpSpPr>
+        <p:cNvPr id="1" name=""/>
+        <p:cNvGrpSpPr/>
+        <p:nvPr/>
+      </p:nvGrpSpPr>
+      <p:grpSpPr>
+        <a:xfrm>
+          <a:off x="0" y="0"/>
+          <a:ext cx="0" cy="0"/>
+          <a:chOff x="0" y="0"/>
+          <a:chExt cx="0" cy="0"/>
+        </a:xfrm>
+      </p:grpSpPr>
+      <p:sp>
+        <p:nvSpPr>
+          <p:cNvPr id="2" name="Slide Image Placeholder 1"/>
+          <p:cNvSpPr>
+            <a:spLocks noGrp="1" noRot="1" noChangeAspect="1"/>
+          </p:cNvSpPr>
+          <p:nvPr>
+            <p:ph type="sldImg"/>
+          </p:nvPr>
+        </p:nvSpPr>
+        <p:spPr/>
+      </p:sp>
+      <p:sp>
+        <p:nvSpPr>
+          <p:cNvPr id="3" name="Notes Placeholder 2"/>
+          <p:cNvSpPr>
+            <a:spLocks noGrp="1"/>
+          </p:cNvSpPr>
+          <p:nvPr>
+            <p:ph type="body" idx="1"/>
+          </p:nvPr>
+        </p:nvSpPr>
+        <p:spPr/>
+        <p:txBody>
+          <a:bodyPr/>
+          <a:lstStyle/>
+          <a:p>
+            <a:pPr marL="0" lvl="0" indent="0">
+              <a:buNone/>
+            </a:pPr>
+            <a:r>
+              <a:t>Junie kennt den Projektkontext, Dateien, Abhängigkeiten und Tests. Das macht das Tool besonders effizient für Implementierung, Refactoring und Tests.</a:t>
+            </a:r>
+          </a:p>
+        </p:txBody>
+      </p:sp>
+      <p:sp>
+        <p:nvSpPr>
+          <p:cNvPr id="4" name="Slide Number Placeholder 3"/>
+          <p:cNvSpPr>
+            <a:spLocks noGrp="1"/>
+          </p:cNvSpPr>
+          <p:nvPr>
+            <p:ph type="sldNum" sz="quarter" idx="10"/>
+          </p:nvPr>
+        </p:nvSpPr>
+        <p:spPr/>
+        <p:txBody>
+          <a:bodyPr/>
+          <a:lstStyle/>
+          <a:p>
+            <a:fld id="{CE7B3DDE-D4F3-48A2-A1E3-A61CF778A29A}" type="slidenum">
+              <a:rPr lang="en-US"/>
+              <a:t>9</a:t>
+            </a:fld>
+            <a:endParaRPr lang="en-US"/>
+          </a:p>
+        </p:txBody>
+      </p:sp>
+    </p:spTree>
+  </p:cSld>
+  <p:clrMapOvr>
+    <a:masterClrMapping/>
+  </p:clrMapOvr>
+</p:notes>
+</file>
+
+<file path=ppt/notesSlides/notesSlide7.xml><?xml version="1.0" encoding="utf-8"?>
+<p:notes xmlns:a="http://schemas.openxmlformats.org/drawingml/2006/main" xmlns:r="http://schemas.openxmlformats.org/officeDocument/2006/relationships" xmlns:p="http://schemas.openxmlformats.org/presentationml/2006/main">
+  <p:cSld>
+    <p:spTree>
+      <p:nvGrpSpPr>
+        <p:cNvPr id="1" name=""/>
+        <p:cNvGrpSpPr/>
+        <p:nvPr/>
+      </p:nvGrpSpPr>
+      <p:grpSpPr>
+        <a:xfrm>
+          <a:off x="0" y="0"/>
+          <a:ext cx="0" cy="0"/>
+          <a:chOff x="0" y="0"/>
+          <a:chExt cx="0" cy="0"/>
+        </a:xfrm>
+      </p:grpSpPr>
+      <p:sp>
+        <p:nvSpPr>
+          <p:cNvPr id="2" name="Slide Image Placeholder 1"/>
+          <p:cNvSpPr>
+            <a:spLocks noGrp="1" noRot="1" noChangeAspect="1"/>
+          </p:cNvSpPr>
+          <p:nvPr>
+            <p:ph type="sldImg"/>
+          </p:nvPr>
+        </p:nvSpPr>
+        <p:spPr/>
+      </p:sp>
+      <p:sp>
+        <p:nvSpPr>
+          <p:cNvPr id="3" name="Notes Placeholder 2"/>
+          <p:cNvSpPr>
+            <a:spLocks noGrp="1"/>
+          </p:cNvSpPr>
+          <p:nvPr>
+            <p:ph type="body" idx="1"/>
+          </p:nvPr>
+        </p:nvSpPr>
+        <p:spPr/>
+        <p:txBody>
+          <a:bodyPr/>
+          <a:lstStyle/>
+          <a:p>
+            <a:pPr marL="0" lvl="0" indent="0">
+              <a:buNone/>
+            </a:pPr>
+            <a:r>
+              <a:t>ChatGPT wird bewusst extern genutzt. Es ist ideal für Reviews, Ideen und Formulierungen, hat aber keinen direkten Zugriff auf den Code. Das reduziert Risiken im Firmenumfeld.</a:t>
+            </a:r>
+          </a:p>
+        </p:txBody>
+      </p:sp>
+      <p:sp>
+        <p:nvSpPr>
+          <p:cNvPr id="4" name="Slide Number Placeholder 3"/>
+          <p:cNvSpPr>
+            <a:spLocks noGrp="1"/>
+          </p:cNvSpPr>
+          <p:nvPr>
+            <p:ph type="sldNum" sz="quarter" idx="10"/>
+          </p:nvPr>
+        </p:nvSpPr>
+        <p:spPr/>
+        <p:txBody>
+          <a:bodyPr/>
+          <a:lstStyle/>
+          <a:p>
+            <a:fld id="{CE7B3DDE-D4F3-48A2-A1E3-A61CF778A29A}" type="slidenum">
+              <a:rPr lang="en-US"/>
+              <a:t>10</a:t>
+            </a:fld>
+            <a:endParaRPr lang="en-US"/>
+          </a:p>
+        </p:txBody>
+      </p:sp>
+    </p:spTree>
+  </p:cSld>
+  <p:clrMapOvr>
+    <a:masterClrMapping/>
+  </p:clrMapOvr>
+</p:notes>
+</file>
+
+<file path=ppt/notesSlides/notesSlide8.xml><?xml version="1.0" encoding="utf-8"?>
+<p:notes xmlns:a="http://schemas.openxmlformats.org/drawingml/2006/main" xmlns:r="http://schemas.openxmlformats.org/officeDocument/2006/relationships" xmlns:p="http://schemas.openxmlformats.org/presentationml/2006/main">
+  <p:cSld>
+    <p:spTree>
+      <p:nvGrpSpPr>
+        <p:cNvPr id="1" name=""/>
+        <p:cNvGrpSpPr/>
+        <p:nvPr/>
+      </p:nvGrpSpPr>
+      <p:grpSpPr>
+        <a:xfrm>
+          <a:off x="0" y="0"/>
+          <a:ext cx="0" cy="0"/>
+          <a:chOff x="0" y="0"/>
+          <a:chExt cx="0" cy="0"/>
+        </a:xfrm>
+      </p:grpSpPr>
+      <p:sp>
+        <p:nvSpPr>
+          <p:cNvPr id="2" name="Slide Image Placeholder 1"/>
+          <p:cNvSpPr>
+            <a:spLocks noGrp="1" noRot="1" noChangeAspect="1"/>
+          </p:cNvSpPr>
+          <p:nvPr>
+            <p:ph type="sldImg"/>
+          </p:nvPr>
+        </p:nvSpPr>
+        <p:spPr/>
+      </p:sp>
+      <p:sp>
+        <p:nvSpPr>
+          <p:cNvPr id="3" name="Notes Placeholder 2"/>
+          <p:cNvSpPr>
+            <a:spLocks noGrp="1"/>
+          </p:cNvSpPr>
+          <p:nvPr>
+            <p:ph type="body" idx="1"/>
+          </p:nvPr>
+        </p:nvSpPr>
+        <p:spPr/>
+        <p:txBody>
+          <a:bodyPr/>
+          <a:lstStyle/>
+          <a:p>
+            <a:pPr marL="0" lvl="0" indent="0">
+              <a:buNone/>
+            </a:pPr>
+            <a:r>
+              <a:t>Prompting-Kompetenz bedeutet: AI liefert nur so gute Ergebnisse wie die Aufgabenstellung. Gute Prompts erfordern Domänenwissen, technisches Verständnis und klare Ziele. AI ersetzt kein Know-how – sie verstärkt es.</a:t>
+            </a:r>
+          </a:p>
+        </p:txBody>
+      </p:sp>
+      <p:sp>
+        <p:nvSpPr>
+          <p:cNvPr id="4" name="Slide Number Placeholder 3"/>
+          <p:cNvSpPr>
+            <a:spLocks noGrp="1"/>
+          </p:cNvSpPr>
+          <p:nvPr>
+            <p:ph type="sldNum" sz="quarter" idx="10"/>
+          </p:nvPr>
+        </p:nvSpPr>
+        <p:spPr/>
+        <p:txBody>
+          <a:bodyPr/>
+          <a:lstStyle/>
+          <a:p>
+            <a:fld id="{CE7B3DDE-D4F3-48A2-A1E3-A61CF778A29A}" type="slidenum">
+              <a:rPr lang="en-US"/>
+              <a:t>11</a:t>
+            </a:fld>
+            <a:endParaRPr lang="en-US"/>
+          </a:p>
+        </p:txBody>
+      </p:sp>
+    </p:spTree>
+  </p:cSld>
+  <p:clrMapOvr>
+    <a:masterClrMapping/>
+  </p:clrMapOvr>
+</p:notes>
+</file>
+
+<file path=ppt/notesSlides/notesSlide9.xml><?xml version="1.0" encoding="utf-8"?>
+<p:notes xmlns:a="http://schemas.openxmlformats.org/drawingml/2006/main" xmlns:r="http://schemas.openxmlformats.org/officeDocument/2006/relationships" xmlns:p="http://schemas.openxmlformats.org/presentationml/2006/main">
+  <p:cSld>
+    <p:spTree>
+      <p:nvGrpSpPr>
+        <p:cNvPr id="1" name=""/>
+        <p:cNvGrpSpPr/>
+        <p:nvPr/>
+      </p:nvGrpSpPr>
+      <p:grpSpPr>
+        <a:xfrm>
+          <a:off x="0" y="0"/>
+          <a:ext cx="0" cy="0"/>
+          <a:chOff x="0" y="0"/>
+          <a:chExt cx="0" cy="0"/>
+        </a:xfrm>
+      </p:grpSpPr>
+      <p:sp>
+        <p:nvSpPr>
+          <p:cNvPr id="2" name="Slide Image Placeholder 1"/>
+          <p:cNvSpPr>
+            <a:spLocks noGrp="1" noRot="1" noChangeAspect="1"/>
+          </p:cNvSpPr>
+          <p:nvPr>
+            <p:ph type="sldImg"/>
+          </p:nvPr>
+        </p:nvSpPr>
+        <p:spPr/>
+      </p:sp>
+      <p:sp>
+        <p:nvSpPr>
+          <p:cNvPr id="3" name="Notes Placeholder 2"/>
+          <p:cNvSpPr>
+            <a:spLocks noGrp="1"/>
+          </p:cNvSpPr>
+          <p:nvPr>
+            <p:ph type="body" idx="1"/>
+          </p:nvPr>
+        </p:nvSpPr>
+        <p:spPr/>
+        <p:txBody>
+          <a:bodyPr/>
+          <a:lstStyle/>
+          <a:p>
+            <a:pPr marL="0" lvl="0" indent="0">
+              <a:buNone/>
+            </a:pPr>
+            <a:r>
+              <a:t>Die Demo zeigt, dass AI heute produktiv eingesetzt werden kann. Entscheidend ist die richtige Kombination von Werkzeugen und die Einbettung in bestehende Entwicklungsprozesse.</a:t>
+            </a:r>
+          </a:p>
+          <a:p>
+            <a:pPr marL="0" lvl="0" indent="0">
+              <a:buNone/>
+            </a:pPr>
+            <a:endParaRPr/>
+          </a:p>
+          <a:p>
+            <a:pPr marL="0" lvl="0" indent="0">
+              <a:buNone/>
+            </a:pPr>
+            <a:r>
+              <a:t>Abschliessende Kernbotschaft: AI beschleunigt Entwicklung, verbessert Qualität, ersetzt aber nicht die Verantwortung des Entwicklers.</a:t>
+            </a:r>
+          </a:p>
+        </p:txBody>
+      </p:sp>
+      <p:sp>
+        <p:nvSpPr>
+          <p:cNvPr id="4" name="Slide Number Placeholder 3"/>
+          <p:cNvSpPr>
+            <a:spLocks noGrp="1"/>
+          </p:cNvSpPr>
+          <p:nvPr>
+            <p:ph type="sldNum" sz="quarter" idx="10"/>
+          </p:nvPr>
+        </p:nvSpPr>
+        <p:spPr/>
+        <p:txBody>
+          <a:bodyPr/>
+          <a:lstStyle/>
+          <a:p>
+            <a:fld id="{CE7B3DDE-D4F3-48A2-A1E3-A61CF778A29A}" type="slidenum">
+              <a:rPr lang="en-US"/>
+              <a:t>12</a:t>
+            </a:fld>
+            <a:endParaRPr lang="en-US"/>
+          </a:p>
+        </p:txBody>
+      </p:sp>
+    </p:spTree>
+  </p:cSld>
+  <p:clrMapOvr>
+    <a:masterClrMapping/>
+  </p:clrMapOvr>
+</p:notes>
+</file>
+
+<file path=ppt/slideLayouts/slideLayout1.xml><?xml version="1.0" encoding="utf-8"?>
+<p:sldLayout xmlns:a="http://schemas.openxmlformats.org/drawingml/2006/main" xmlns:r="http://schemas.openxmlformats.org/officeDocument/2006/relationships" xmlns:p="http://schemas.openxmlformats.org/presentationml/2006/main" type="title" preserve="1">
+  <p:cSld name="Title Slide">
+    <p:bg>
+      <p:bgPr>
+        <a:blipFill dpi="0" rotWithShape="1">
+          <a:blip r:embed="rId2">
+            <a:lum/>
+          </a:blip>
+          <a:srcRect/>
+          <a:stretch>
+            <a:fillRect/>
+          </a:stretch>
+        </a:blipFill>
+        <a:effectLst/>
+      </p:bgPr>
+    </p:bg>
+    <p:spTree>
+      <p:nvGrpSpPr>
+        <p:cNvPr id="1" name=""/>
+        <p:cNvGrpSpPr/>
+        <p:nvPr/>
+      </p:nvGrpSpPr>
+      <p:grpSpPr>
+        <a:xfrm>
+          <a:off x="0" y="0"/>
+          <a:ext cx="0" cy="0"/>
+          <a:chOff x="0" y="0"/>
+          <a:chExt cx="0" cy="0"/>
+        </a:xfrm>
+      </p:grpSpPr>
+      <p:sp>
+        <p:nvSpPr>
           <p:cNvPr id="2" name="Title 1">
             <a:extLst>
               <a:ext uri="{FF2B5EF4-FFF2-40B4-BE49-F238E27FC236}">
@@ -606,6 +1321,9 @@
             </a:lvl1pPr>
           </a:lstStyle>
           <a:p>
+            <a:pPr>
+              <a:defRPr sz="2200"/>
+            </a:pPr>
             <a:r>
               <a:rPr lang="en-US"/>
               <a:t>Click to edit Master title style</a:t>
@@ -677,6 +1395,9 @@
             </a:lvl9pPr>
           </a:lstStyle>
           <a:p>
+            <a:pPr>
+              <a:defRPr sz="2200"/>
+            </a:pPr>
             <a:r>
               <a:rPr lang="en-US"/>
               <a:t>Click to edit Master subtitle style</a:t>
@@ -706,9 +1427,12 @@
           <a:bodyPr/>
           <a:lstStyle/>
           <a:p>
+            <a:pPr>
+              <a:defRPr sz="2200"/>
+            </a:pPr>
             <a:fld id="{0CDDCF47-76FA-4B38-9020-A0E57F41036A}" type="datetimeFigureOut">
               <a:rPr lang="de-CH" smtClean="0"/>
-              <a:t>11.01.2026</a:t>
+              <a:t>13.01.2026</a:t>
             </a:fld>
             <a:endParaRPr lang="de-CH"/>
           </a:p>
@@ -735,6 +1459,9 @@
           <a:bodyPr/>
           <a:lstStyle/>
           <a:p>
+            <a:pPr>
+              <a:defRPr sz="2200"/>
+            </a:pPr>
             <a:endParaRPr lang="de-CH"/>
           </a:p>
         </p:txBody>
@@ -760,6 +1487,9 @@
           <a:bodyPr/>
           <a:lstStyle/>
           <a:p>
+            <a:pPr>
+              <a:defRPr sz="2200"/>
+            </a:pPr>
             <a:fld id="{EA2E0D3E-E818-438E-981B-E98523AC6CA8}" type="slidenum">
               <a:rPr lang="de-CH" smtClean="0"/>
               <a:t>‹#›</a:t>
@@ -819,6 +1549,9 @@
           <a:bodyPr/>
           <a:lstStyle/>
           <a:p>
+            <a:pPr>
+              <a:defRPr sz="2200"/>
+            </a:pPr>
             <a:r>
               <a:rPr lang="en-US"/>
               <a:t>Click to edit Master title style</a:t>
@@ -848,35 +1581,45 @@
           <a:bodyPr vert="eaVert"/>
           <a:lstStyle/>
           <a:p>
-            <a:pPr lvl="0"/>
+            <a:pPr lvl="0">
+              <a:defRPr sz="2200"/>
+            </a:pPr>
             <a:r>
               <a:rPr lang="en-US"/>
               <a:t>Click to edit Master text styles</a:t>
             </a:r>
           </a:p>
           <a:p>
-            <a:pPr lvl="1"/>
+            <a:pPr lvl="1">
+              <a:defRPr sz="1800"/>
+            </a:pPr>
             <a:r>
               <a:rPr lang="en-US"/>
               <a:t>Second level</a:t>
             </a:r>
           </a:p>
           <a:p>
-            <a:pPr lvl="2"/>
+            <a:pPr lvl="2">
+              <a:defRPr sz="1600"/>
+            </a:pPr>
             <a:r>
               <a:rPr lang="en-US"/>
               <a:t>Third level</a:t>
             </a:r>
           </a:p>
           <a:p>
-            <a:pPr lvl="3"/>
+            <a:pPr lvl="3">
+              <a:defRPr sz="1600"/>
+            </a:pPr>
             <a:r>
               <a:rPr lang="en-US"/>
               <a:t>Fourth level</a:t>
             </a:r>
           </a:p>
           <a:p>
-            <a:pPr lvl="4"/>
+            <a:pPr lvl="4">
+              <a:defRPr sz="1600"/>
+            </a:pPr>
             <a:r>
               <a:rPr lang="en-US"/>
               <a:t>Fifth level</a:t>
@@ -906,9 +1649,12 @@
           <a:bodyPr/>
           <a:lstStyle/>
           <a:p>
+            <a:pPr>
+              <a:defRPr sz="2200"/>
+            </a:pPr>
             <a:fld id="{0CDDCF47-76FA-4B38-9020-A0E57F41036A}" type="datetimeFigureOut">
               <a:rPr lang="de-CH" smtClean="0"/>
-              <a:t>11.01.2026</a:t>
+              <a:t>13.01.2026</a:t>
             </a:fld>
             <a:endParaRPr lang="de-CH"/>
           </a:p>
@@ -935,6 +1681,9 @@
           <a:bodyPr/>
           <a:lstStyle/>
           <a:p>
+            <a:pPr>
+              <a:defRPr sz="2200"/>
+            </a:pPr>
             <a:endParaRPr lang="de-CH"/>
           </a:p>
         </p:txBody>
@@ -960,6 +1709,9 @@
           <a:bodyPr/>
           <a:lstStyle/>
           <a:p>
+            <a:pPr>
+              <a:defRPr sz="2200"/>
+            </a:pPr>
             <a:fld id="{EA2E0D3E-E818-438E-981B-E98523AC6CA8}" type="slidenum">
               <a:rPr lang="de-CH" smtClean="0"/>
               <a:t>‹#›</a:t>
@@ -1024,6 +1776,9 @@
           <a:bodyPr vert="eaVert"/>
           <a:lstStyle/>
           <a:p>
+            <a:pPr>
+              <a:defRPr sz="2200"/>
+            </a:pPr>
             <a:r>
               <a:rPr lang="en-US"/>
               <a:t>Click to edit Master title style</a:t>
@@ -1058,35 +1813,45 @@
           <a:bodyPr vert="eaVert"/>
           <a:lstStyle/>
           <a:p>
-            <a:pPr lvl="0"/>
+            <a:pPr lvl="0">
+              <a:defRPr sz="2200"/>
+            </a:pPr>
             <a:r>
               <a:rPr lang="en-US"/>
               <a:t>Click to edit Master text styles</a:t>
             </a:r>
           </a:p>
           <a:p>
-            <a:pPr lvl="1"/>
+            <a:pPr lvl="1">
+              <a:defRPr sz="1800"/>
+            </a:pPr>
             <a:r>
               <a:rPr lang="en-US"/>
               <a:t>Second level</a:t>
             </a:r>
           </a:p>
           <a:p>
-            <a:pPr lvl="2"/>
+            <a:pPr lvl="2">
+              <a:defRPr sz="1600"/>
+            </a:pPr>
             <a:r>
               <a:rPr lang="en-US"/>
               <a:t>Third level</a:t>
             </a:r>
           </a:p>
           <a:p>
-            <a:pPr lvl="3"/>
+            <a:pPr lvl="3">
+              <a:defRPr sz="1600"/>
+            </a:pPr>
             <a:r>
               <a:rPr lang="en-US"/>
               <a:t>Fourth level</a:t>
             </a:r>
           </a:p>
           <a:p>
-            <a:pPr lvl="4"/>
+            <a:pPr lvl="4">
+              <a:defRPr sz="1600"/>
+            </a:pPr>
             <a:r>
               <a:rPr lang="en-US"/>
               <a:t>Fifth level</a:t>
@@ -1116,9 +1881,12 @@
           <a:bodyPr/>
           <a:lstStyle/>
           <a:p>
+            <a:pPr>
+              <a:defRPr sz="2200"/>
+            </a:pPr>
             <a:fld id="{0CDDCF47-76FA-4B38-9020-A0E57F41036A}" type="datetimeFigureOut">
               <a:rPr lang="de-CH" smtClean="0"/>
-              <a:t>11.01.2026</a:t>
+              <a:t>13.01.2026</a:t>
             </a:fld>
             <a:endParaRPr lang="de-CH"/>
           </a:p>
@@ -1145,6 +1913,9 @@
           <a:bodyPr/>
           <a:lstStyle/>
           <a:p>
+            <a:pPr>
+              <a:defRPr sz="2200"/>
+            </a:pPr>
             <a:endParaRPr lang="de-CH"/>
           </a:p>
         </p:txBody>
@@ -1170,6 +1941,9 @@
           <a:bodyPr/>
           <a:lstStyle/>
           <a:p>
+            <a:pPr>
+              <a:defRPr sz="2200"/>
+            </a:pPr>
             <a:fld id="{EA2E0D3E-E818-438E-981B-E98523AC6CA8}" type="slidenum">
               <a:rPr lang="de-CH" smtClean="0"/>
               <a:t>‹#›</a:t>
@@ -1208,43 +1982,6 @@
           <a:chExt cx="0" cy="0"/>
         </a:xfrm>
       </p:grpSpPr>
-      <p:pic>
-        <p:nvPicPr>
-          <p:cNvPr id="7" name="Hintergrundbild">
-            <a:extLst>
-              <a:ext uri="{FF2B5EF4-FFF2-40B4-BE49-F238E27FC236}">
-                <a16:creationId xmlns:a16="http://schemas.microsoft.com/office/drawing/2014/main" id="{3D1FB8BF-7CDF-39AE-7E27-7E86A69D9163}"/>
-              </a:ext>
-            </a:extLst>
-          </p:cNvPr>
-          <p:cNvPicPr>
-            <a:picLocks/>
-          </p:cNvPicPr>
-          <p:nvPr userDrawn="1"/>
-        </p:nvPicPr>
-        <p:blipFill>
-          <a:blip r:embed="rId2">
-            <a:extLst>
-              <a:ext uri="{28A0092B-C50C-407E-A947-70E740481C1C}">
-                <a14:useLocalDpi xmlns:a14="http://schemas.microsoft.com/office/drawing/2010/main" val="0"/>
-              </a:ext>
-            </a:extLst>
-          </a:blip>
-          <a:srcRect l="21" r="21"/>
-          <a:stretch>
-            <a:fillRect/>
-          </a:stretch>
-        </p:blipFill>
-        <p:spPr>
-          <a:xfrm>
-            <a:off x="0" y="0"/>
-            <a:ext cx="12192000" cy="6858000"/>
-          </a:xfrm>
-          <a:prstGeom prst="rect">
-            <a:avLst/>
-          </a:prstGeom>
-        </p:spPr>
-      </p:pic>
       <p:sp>
         <p:nvSpPr>
           <p:cNvPr id="2" name="Titel 1">
@@ -1292,16 +2029,23 @@
             </a:lvl1pPr>
           </a:lstStyle>
           <a:p>
+            <a:pPr>
+              <a:defRPr sz="2200"/>
+            </a:pPr>
+            <a:r>
+              <a:rPr lang="de-CH" dirty="0"/>
+              <a:t>Präsentationstitel</a:t>
+            </a:r>
+            <a:br>
+              <a:rPr lang="de-CH" dirty="0"/>
+            </a:br>
+            <a:r>
+              <a:rPr lang="de-CH" dirty="0"/>
+              <a:t>(max. </a:t>
+            </a:r>
             <a:r>
               <a:rPr lang="de-CH"/>
-              <a:t>Präsentationstitel</a:t>
-            </a:r>
-            <a:br>
-              <a:rPr lang="de-CH"/>
-            </a:br>
-            <a:r>
-              <a:rPr lang="de-CH"/>
-              <a:t>(max. dreizeilig)</a:t>
+              <a:t>dreizeilig)</a:t>
             </a:r>
             <a:endParaRPr lang="de-CH" dirty="0"/>
           </a:p>
@@ -1379,6 +2123,9 @@
             </a:lvl9pPr>
           </a:lstStyle>
           <a:p>
+            <a:pPr>
+              <a:defRPr sz="2200"/>
+            </a:pPr>
             <a:r>
               <a:rPr lang="de-CH"/>
               <a:t>Titel</a:t>
@@ -1434,7 +2181,9 @@
             </a:lvl1pPr>
           </a:lstStyle>
           <a:p>
-            <a:pPr lvl="0"/>
+            <a:pPr lvl="0">
+              <a:defRPr sz="2200"/>
+            </a:pPr>
             <a:r>
               <a:rPr lang="de-CH"/>
               <a:t>Referenz, Abteilung, Datum</a:t>
@@ -1458,10 +2207,10 @@
           <p:nvPr userDrawn="1"/>
         </p:nvPicPr>
         <p:blipFill>
-          <a:blip r:embed="rId3">
+          <a:blip r:embed="rId2">
             <a:extLst>
               <a:ext uri="{96DAC541-7B7A-43D3-8B79-37D633B846F1}">
-                <asvg:svgBlip xmlns:asvg="http://schemas.microsoft.com/office/drawing/2016/SVG/main" r:embed="rId4"/>
+                <asvg:svgBlip xmlns:asvg="http://schemas.microsoft.com/office/drawing/2016/SVG/main" r:embed="rId3"/>
               </a:ext>
             </a:extLst>
           </a:blip>
@@ -1506,7 +2255,9 @@
           </a:bodyPr>
           <a:lstStyle/>
           <a:p>
-            <a:pPr algn="l"/>
+            <a:pPr algn="l">
+              <a:defRPr sz="2200"/>
+            </a:pPr>
             <a:r>
               <a:rPr lang="de-CH" sz="1517" b="1" i="0" u="none" dirty="0">
                 <a:solidFill>
@@ -1838,6 +2589,9 @@
             </a:lvl1pPr>
           </a:lstStyle>
           <a:p>
+            <a:pPr>
+              <a:defRPr sz="2200"/>
+            </a:pPr>
             <a:r>
               <a:rPr lang="de-CH"/>
               <a:t>Agenda</a:t>
@@ -1893,6 +2647,9 @@
             </a:lvl1pPr>
           </a:lstStyle>
           <a:p>
+            <a:pPr>
+              <a:defRPr sz="2200"/>
+            </a:pPr>
             <a:fld id="{DF46F67B-DFC5-4D4D-B823-2A149AD963A3}" type="slidenum">
               <a:rPr lang="de-CH" smtClean="0"/>
               <a:pPr/>
@@ -1949,6 +2706,9 @@
             </a:lvl1pPr>
           </a:lstStyle>
           <a:p>
+            <a:pPr>
+              <a:defRPr sz="2200"/>
+            </a:pPr>
             <a:endParaRPr lang="de-CH" dirty="0"/>
           </a:p>
         </p:txBody>
@@ -2070,7 +2830,9 @@
             </a:lvl5pPr>
           </a:lstStyle>
           <a:p>
-            <a:pPr lvl="0"/>
+            <a:pPr lvl="0">
+              <a:defRPr sz="2200"/>
+            </a:pPr>
             <a:r>
               <a:rPr lang="de-CH" dirty="0" err="1"/>
               <a:t>Agendapunkt</a:t>
@@ -2158,6 +2920,9 @@
             </a:lvl1pPr>
           </a:lstStyle>
           <a:p>
+            <a:pPr>
+              <a:defRPr sz="2200"/>
+            </a:pPr>
             <a:r>
               <a:rPr lang="de-CH"/>
               <a:t>Titel (max. zweizeilig)</a:t>
@@ -2213,6 +2978,9 @@
             </a:lvl1pPr>
           </a:lstStyle>
           <a:p>
+            <a:pPr>
+              <a:defRPr sz="2200"/>
+            </a:pPr>
             <a:fld id="{DF46F67B-DFC5-4D4D-B823-2A149AD963A3}" type="slidenum">
               <a:rPr lang="de-CH" smtClean="0"/>
               <a:pPr/>
@@ -2269,6 +3037,9 @@
             </a:lvl1pPr>
           </a:lstStyle>
           <a:p>
+            <a:pPr>
+              <a:defRPr sz="2200"/>
+            </a:pPr>
             <a:endParaRPr lang="de-CH" dirty="0"/>
           </a:p>
         </p:txBody>
@@ -2390,35 +3161,45 @@
             </a:lvl5pPr>
           </a:lstStyle>
           <a:p>
-            <a:pPr lvl="0"/>
+            <a:pPr lvl="0">
+              <a:defRPr sz="2200"/>
+            </a:pPr>
             <a:r>
               <a:rPr lang="de-CH" dirty="0"/>
               <a:t>Erste Ebene</a:t>
             </a:r>
           </a:p>
           <a:p>
-            <a:pPr lvl="1"/>
+            <a:pPr lvl="1">
+              <a:defRPr sz="1800"/>
+            </a:pPr>
             <a:r>
               <a:rPr lang="de-CH" dirty="0"/>
               <a:t>Zweite Ebene</a:t>
             </a:r>
           </a:p>
           <a:p>
-            <a:pPr lvl="2"/>
+            <a:pPr lvl="2">
+              <a:defRPr sz="1600"/>
+            </a:pPr>
             <a:r>
               <a:rPr lang="de-CH" dirty="0"/>
               <a:t>Dritte Ebene</a:t>
             </a:r>
           </a:p>
           <a:p>
-            <a:pPr lvl="3"/>
+            <a:pPr lvl="3">
+              <a:defRPr sz="1600"/>
+            </a:pPr>
             <a:r>
               <a:rPr lang="de-CH" dirty="0"/>
               <a:t>Vierte Ebene</a:t>
             </a:r>
           </a:p>
           <a:p>
-            <a:pPr lvl="4"/>
+            <a:pPr lvl="4">
+              <a:defRPr sz="1600"/>
+            </a:pPr>
             <a:r>
               <a:rPr lang="de-CH" dirty="0"/>
               <a:t>Fünfte Ebene</a:t>
@@ -2543,35 +3324,45 @@
             </a:lvl5pPr>
           </a:lstStyle>
           <a:p>
-            <a:pPr lvl="0"/>
+            <a:pPr lvl="0">
+              <a:defRPr sz="2200"/>
+            </a:pPr>
             <a:r>
               <a:rPr lang="de-CH" dirty="0"/>
               <a:t>Erste Ebene</a:t>
             </a:r>
           </a:p>
           <a:p>
-            <a:pPr lvl="1"/>
+            <a:pPr lvl="1">
+              <a:defRPr sz="1800"/>
+            </a:pPr>
             <a:r>
               <a:rPr lang="de-CH" dirty="0"/>
               <a:t>Zweite Ebene</a:t>
             </a:r>
           </a:p>
           <a:p>
-            <a:pPr lvl="2"/>
+            <a:pPr lvl="2">
+              <a:defRPr sz="1600"/>
+            </a:pPr>
             <a:r>
               <a:rPr lang="de-CH" dirty="0"/>
               <a:t>Dritte Ebene</a:t>
             </a:r>
           </a:p>
           <a:p>
-            <a:pPr lvl="3"/>
+            <a:pPr lvl="3">
+              <a:defRPr sz="1600"/>
+            </a:pPr>
             <a:r>
               <a:rPr lang="de-CH" dirty="0"/>
               <a:t>Vierte Ebene</a:t>
             </a:r>
           </a:p>
           <a:p>
-            <a:pPr lvl="4"/>
+            <a:pPr lvl="4">
+              <a:defRPr sz="1600"/>
+            </a:pPr>
             <a:r>
               <a:rPr lang="de-CH" dirty="0"/>
               <a:t>Fünfte Ebene</a:t>
@@ -2658,6 +3449,9 @@
             </a:lvl1pPr>
           </a:lstStyle>
           <a:p>
+            <a:pPr>
+              <a:defRPr sz="2200"/>
+            </a:pPr>
             <a:r>
               <a:rPr lang="de-CH"/>
               <a:t>Titel (max. zweizeilig)</a:t>
@@ -2713,6 +3507,9 @@
             </a:lvl1pPr>
           </a:lstStyle>
           <a:p>
+            <a:pPr>
+              <a:defRPr sz="2200"/>
+            </a:pPr>
             <a:fld id="{DF46F67B-DFC5-4D4D-B823-2A149AD963A3}" type="slidenum">
               <a:rPr lang="de-CH" smtClean="0"/>
               <a:pPr/>
@@ -2769,6 +3566,9 @@
             </a:lvl1pPr>
           </a:lstStyle>
           <a:p>
+            <a:pPr>
+              <a:defRPr sz="2200"/>
+            </a:pPr>
             <a:endParaRPr lang="de-CH" dirty="0"/>
           </a:p>
         </p:txBody>
@@ -2890,35 +3690,45 @@
             </a:lvl5pPr>
           </a:lstStyle>
           <a:p>
-            <a:pPr lvl="0"/>
+            <a:pPr lvl="0">
+              <a:defRPr sz="2200"/>
+            </a:pPr>
             <a:r>
               <a:rPr lang="de-CH" dirty="0"/>
               <a:t>Erste Ebene</a:t>
             </a:r>
           </a:p>
           <a:p>
-            <a:pPr lvl="1"/>
+            <a:pPr lvl="1">
+              <a:defRPr sz="1800"/>
+            </a:pPr>
             <a:r>
               <a:rPr lang="de-CH" dirty="0"/>
               <a:t>Zweite Ebene</a:t>
             </a:r>
           </a:p>
           <a:p>
-            <a:pPr lvl="2"/>
+            <a:pPr lvl="2">
+              <a:defRPr sz="1600"/>
+            </a:pPr>
             <a:r>
               <a:rPr lang="de-CH" dirty="0"/>
               <a:t>Dritte Ebene</a:t>
             </a:r>
           </a:p>
           <a:p>
-            <a:pPr lvl="3"/>
+            <a:pPr lvl="3">
+              <a:defRPr sz="1600"/>
+            </a:pPr>
             <a:r>
               <a:rPr lang="de-CH" dirty="0"/>
               <a:t>Vierte Ebene</a:t>
             </a:r>
           </a:p>
           <a:p>
-            <a:pPr lvl="4"/>
+            <a:pPr lvl="4">
+              <a:defRPr sz="1600"/>
+            </a:pPr>
             <a:r>
               <a:rPr lang="de-CH" dirty="0"/>
               <a:t>Fünfte Ebene</a:t>
@@ -3043,35 +3853,45 @@
             </a:lvl5pPr>
           </a:lstStyle>
           <a:p>
-            <a:pPr lvl="0"/>
+            <a:pPr lvl="0">
+              <a:defRPr sz="2200"/>
+            </a:pPr>
             <a:r>
               <a:rPr lang="de-CH" dirty="0"/>
               <a:t>Erste Ebene</a:t>
             </a:r>
           </a:p>
           <a:p>
-            <a:pPr lvl="1"/>
+            <a:pPr lvl="1">
+              <a:defRPr sz="1800"/>
+            </a:pPr>
             <a:r>
               <a:rPr lang="de-CH" dirty="0"/>
               <a:t>Zweite Ebene</a:t>
             </a:r>
           </a:p>
           <a:p>
-            <a:pPr lvl="2"/>
+            <a:pPr lvl="2">
+              <a:defRPr sz="1600"/>
+            </a:pPr>
             <a:r>
               <a:rPr lang="de-CH" dirty="0"/>
               <a:t>Dritte Ebene</a:t>
             </a:r>
           </a:p>
           <a:p>
-            <a:pPr lvl="3"/>
+            <a:pPr lvl="3">
+              <a:defRPr sz="1600"/>
+            </a:pPr>
             <a:r>
               <a:rPr lang="de-CH" dirty="0"/>
               <a:t>Vierte Ebene</a:t>
             </a:r>
           </a:p>
           <a:p>
-            <a:pPr lvl="4"/>
+            <a:pPr lvl="4">
+              <a:defRPr sz="1600"/>
+            </a:pPr>
             <a:r>
               <a:rPr lang="de-CH" dirty="0"/>
               <a:t>Fünfte Ebene</a:t>
@@ -3126,7 +3946,9 @@
             </a:lvl1pPr>
           </a:lstStyle>
           <a:p>
-            <a:pPr lvl="0"/>
+            <a:pPr lvl="0">
+              <a:defRPr sz="2200"/>
+            </a:pPr>
             <a:r>
               <a:rPr lang="de-CH"/>
               <a:t>Untertitel</a:t>
@@ -3182,7 +4004,9 @@
             </a:lvl1pPr>
           </a:lstStyle>
           <a:p>
-            <a:pPr lvl="0"/>
+            <a:pPr lvl="0">
+              <a:defRPr sz="2200"/>
+            </a:pPr>
             <a:r>
               <a:rPr lang="de-CH"/>
               <a:t>Untertitel</a:t>
@@ -3242,6 +4066,9 @@
           <a:bodyPr/>
           <a:lstStyle/>
           <a:p>
+            <a:pPr>
+              <a:defRPr sz="2200"/>
+            </a:pPr>
             <a:r>
               <a:rPr lang="en-US"/>
               <a:t>Click to edit Master title style</a:t>
@@ -3271,35 +4098,45 @@
           <a:bodyPr/>
           <a:lstStyle/>
           <a:p>
-            <a:pPr lvl="0"/>
+            <a:pPr lvl="0">
+              <a:defRPr sz="2200"/>
+            </a:pPr>
             <a:r>
               <a:rPr lang="en-US"/>
               <a:t>Click to edit Master text styles</a:t>
             </a:r>
           </a:p>
           <a:p>
-            <a:pPr lvl="1"/>
+            <a:pPr lvl="1">
+              <a:defRPr sz="1800"/>
+            </a:pPr>
             <a:r>
               <a:rPr lang="en-US"/>
               <a:t>Second level</a:t>
             </a:r>
           </a:p>
           <a:p>
-            <a:pPr lvl="2"/>
+            <a:pPr lvl="2">
+              <a:defRPr sz="1600"/>
+            </a:pPr>
             <a:r>
               <a:rPr lang="en-US"/>
               <a:t>Third level</a:t>
             </a:r>
           </a:p>
           <a:p>
-            <a:pPr lvl="3"/>
+            <a:pPr lvl="3">
+              <a:defRPr sz="1600"/>
+            </a:pPr>
             <a:r>
               <a:rPr lang="en-US"/>
               <a:t>Fourth level</a:t>
             </a:r>
           </a:p>
           <a:p>
-            <a:pPr lvl="4"/>
+            <a:pPr lvl="4">
+              <a:defRPr sz="1600"/>
+            </a:pPr>
             <a:r>
               <a:rPr lang="en-US"/>
               <a:t>Fifth level</a:t>
@@ -3329,9 +4166,12 @@
           <a:bodyPr/>
           <a:lstStyle/>
           <a:p>
+            <a:pPr>
+              <a:defRPr sz="2200"/>
+            </a:pPr>
             <a:fld id="{0CDDCF47-76FA-4B38-9020-A0E57F41036A}" type="datetimeFigureOut">
               <a:rPr lang="de-CH" smtClean="0"/>
-              <a:t>11.01.2026</a:t>
+              <a:t>13.01.2026</a:t>
             </a:fld>
             <a:endParaRPr lang="de-CH"/>
           </a:p>
@@ -3358,6 +4198,9 @@
           <a:bodyPr/>
           <a:lstStyle/>
           <a:p>
+            <a:pPr>
+              <a:defRPr sz="2200"/>
+            </a:pPr>
             <a:endParaRPr lang="de-CH"/>
           </a:p>
         </p:txBody>
@@ -3383,6 +4226,9 @@
           <a:bodyPr/>
           <a:lstStyle/>
           <a:p>
+            <a:pPr>
+              <a:defRPr sz="2200"/>
+            </a:pPr>
             <a:fld id="{EA2E0D3E-E818-438E-981B-E98523AC6CA8}" type="slidenum">
               <a:rPr lang="de-CH" smtClean="0"/>
               <a:t>‹#›</a:t>
@@ -3451,6 +4297,9 @@
             </a:lvl1pPr>
           </a:lstStyle>
           <a:p>
+            <a:pPr>
+              <a:defRPr sz="2200"/>
+            </a:pPr>
             <a:r>
               <a:rPr lang="en-US"/>
               <a:t>Click to edit Master title style</a:t>
@@ -3576,7 +4425,9 @@
             </a:lvl9pPr>
           </a:lstStyle>
           <a:p>
-            <a:pPr lvl="0"/>
+            <a:pPr lvl="0">
+              <a:defRPr sz="2200"/>
+            </a:pPr>
             <a:r>
               <a:rPr lang="en-US"/>
               <a:t>Click to edit Master text styles</a:t>
@@ -3605,9 +4456,12 @@
           <a:bodyPr/>
           <a:lstStyle/>
           <a:p>
+            <a:pPr>
+              <a:defRPr sz="2200"/>
+            </a:pPr>
             <a:fld id="{0CDDCF47-76FA-4B38-9020-A0E57F41036A}" type="datetimeFigureOut">
               <a:rPr lang="de-CH" smtClean="0"/>
-              <a:t>11.01.2026</a:t>
+              <a:t>13.01.2026</a:t>
             </a:fld>
             <a:endParaRPr lang="de-CH"/>
           </a:p>
@@ -3634,6 +4488,9 @@
           <a:bodyPr/>
           <a:lstStyle/>
           <a:p>
+            <a:pPr>
+              <a:defRPr sz="2200"/>
+            </a:pPr>
             <a:endParaRPr lang="de-CH"/>
           </a:p>
         </p:txBody>
@@ -3659,6 +4516,9 @@
           <a:bodyPr/>
           <a:lstStyle/>
           <a:p>
+            <a:pPr>
+              <a:defRPr sz="2200"/>
+            </a:pPr>
             <a:fld id="{EA2E0D3E-E818-438E-981B-E98523AC6CA8}" type="slidenum">
               <a:rPr lang="de-CH" smtClean="0"/>
               <a:t>‹#›</a:t>
@@ -3718,6 +4578,9 @@
           <a:bodyPr/>
           <a:lstStyle/>
           <a:p>
+            <a:pPr>
+              <a:defRPr sz="2200"/>
+            </a:pPr>
             <a:r>
               <a:rPr lang="en-US"/>
               <a:t>Click to edit Master title style</a:t>
@@ -3752,35 +4615,45 @@
           <a:bodyPr/>
           <a:lstStyle/>
           <a:p>
-            <a:pPr lvl="0"/>
+            <a:pPr lvl="0">
+              <a:defRPr sz="2200"/>
+            </a:pPr>
             <a:r>
               <a:rPr lang="en-US"/>
               <a:t>Click to edit Master text styles</a:t>
             </a:r>
           </a:p>
           <a:p>
-            <a:pPr lvl="1"/>
+            <a:pPr lvl="1">
+              <a:defRPr sz="1800"/>
+            </a:pPr>
             <a:r>
               <a:rPr lang="en-US"/>
               <a:t>Second level</a:t>
             </a:r>
           </a:p>
           <a:p>
-            <a:pPr lvl="2"/>
+            <a:pPr lvl="2">
+              <a:defRPr sz="1600"/>
+            </a:pPr>
             <a:r>
               <a:rPr lang="en-US"/>
               <a:t>Third level</a:t>
             </a:r>
           </a:p>
           <a:p>
-            <a:pPr lvl="3"/>
+            <a:pPr lvl="3">
+              <a:defRPr sz="1600"/>
+            </a:pPr>
             <a:r>
               <a:rPr lang="en-US"/>
               <a:t>Fourth level</a:t>
             </a:r>
           </a:p>
           <a:p>
-            <a:pPr lvl="4"/>
+            <a:pPr lvl="4">
+              <a:defRPr sz="1600"/>
+            </a:pPr>
             <a:r>
               <a:rPr lang="en-US"/>
               <a:t>Fifth level</a:t>
@@ -3815,35 +4688,45 @@
           <a:bodyPr/>
           <a:lstStyle/>
           <a:p>
-            <a:pPr lvl="0"/>
+            <a:pPr lvl="0">
+              <a:defRPr sz="2200"/>
+            </a:pPr>
             <a:r>
               <a:rPr lang="en-US"/>
               <a:t>Click to edit Master text styles</a:t>
             </a:r>
           </a:p>
           <a:p>
-            <a:pPr lvl="1"/>
+            <a:pPr lvl="1">
+              <a:defRPr sz="1800"/>
+            </a:pPr>
             <a:r>
               <a:rPr lang="en-US"/>
               <a:t>Second level</a:t>
             </a:r>
           </a:p>
           <a:p>
-            <a:pPr lvl="2"/>
+            <a:pPr lvl="2">
+              <a:defRPr sz="1600"/>
+            </a:pPr>
             <a:r>
               <a:rPr lang="en-US"/>
               <a:t>Third level</a:t>
             </a:r>
           </a:p>
           <a:p>
-            <a:pPr lvl="3"/>
+            <a:pPr lvl="3">
+              <a:defRPr sz="1600"/>
+            </a:pPr>
             <a:r>
               <a:rPr lang="en-US"/>
               <a:t>Fourth level</a:t>
             </a:r>
           </a:p>
           <a:p>
-            <a:pPr lvl="4"/>
+            <a:pPr lvl="4">
+              <a:defRPr sz="1600"/>
+            </a:pPr>
             <a:r>
               <a:rPr lang="en-US"/>
               <a:t>Fifth level</a:t>
@@ -3873,9 +4756,12 @@
           <a:bodyPr/>
           <a:lstStyle/>
           <a:p>
+            <a:pPr>
+              <a:defRPr sz="2200"/>
+            </a:pPr>
             <a:fld id="{0CDDCF47-76FA-4B38-9020-A0E57F41036A}" type="datetimeFigureOut">
               <a:rPr lang="de-CH" smtClean="0"/>
-              <a:t>11.01.2026</a:t>
+              <a:t>13.01.2026</a:t>
             </a:fld>
             <a:endParaRPr lang="de-CH"/>
           </a:p>
@@ -3902,6 +4788,9 @@
           <a:bodyPr/>
           <a:lstStyle/>
           <a:p>
+            <a:pPr>
+              <a:defRPr sz="2200"/>
+            </a:pPr>
             <a:endParaRPr lang="de-CH"/>
           </a:p>
         </p:txBody>
@@ -3927,6 +4816,9 @@
           <a:bodyPr/>
           <a:lstStyle/>
           <a:p>
+            <a:pPr>
+              <a:defRPr sz="2200"/>
+            </a:pPr>
             <a:fld id="{EA2E0D3E-E818-438E-981B-E98523AC6CA8}" type="slidenum">
               <a:rPr lang="de-CH" smtClean="0"/>
               <a:t>‹#›</a:t>
@@ -3991,6 +4883,9 @@
           <a:bodyPr/>
           <a:lstStyle/>
           <a:p>
+            <a:pPr>
+              <a:defRPr sz="2200"/>
+            </a:pPr>
             <a:r>
               <a:rPr lang="en-US"/>
               <a:t>Click to edit Master title style</a:t>
@@ -4062,7 +4957,9 @@
             </a:lvl9pPr>
           </a:lstStyle>
           <a:p>
-            <a:pPr lvl="0"/>
+            <a:pPr lvl="0">
+              <a:defRPr sz="2200"/>
+            </a:pPr>
             <a:r>
               <a:rPr lang="en-US"/>
               <a:t>Click to edit Master text styles</a:t>
@@ -4096,35 +4993,45 @@
           <a:bodyPr/>
           <a:lstStyle/>
           <a:p>
-            <a:pPr lvl="0"/>
+            <a:pPr lvl="0">
+              <a:defRPr sz="2200"/>
+            </a:pPr>
             <a:r>
               <a:rPr lang="en-US"/>
               <a:t>Click to edit Master text styles</a:t>
             </a:r>
           </a:p>
           <a:p>
-            <a:pPr lvl="1"/>
+            <a:pPr lvl="1">
+              <a:defRPr sz="1800"/>
+            </a:pPr>
             <a:r>
               <a:rPr lang="en-US"/>
               <a:t>Second level</a:t>
             </a:r>
           </a:p>
           <a:p>
-            <a:pPr lvl="2"/>
+            <a:pPr lvl="2">
+              <a:defRPr sz="1600"/>
+            </a:pPr>
             <a:r>
               <a:rPr lang="en-US"/>
               <a:t>Third level</a:t>
             </a:r>
           </a:p>
           <a:p>
-            <a:pPr lvl="3"/>
+            <a:pPr lvl="3">
+              <a:defRPr sz="1600"/>
+            </a:pPr>
             <a:r>
               <a:rPr lang="en-US"/>
               <a:t>Fourth level</a:t>
             </a:r>
           </a:p>
           <a:p>
-            <a:pPr lvl="4"/>
+            <a:pPr lvl="4">
+              <a:defRPr sz="1600"/>
+            </a:pPr>
             <a:r>
               <a:rPr lang="en-US"/>
               <a:t>Fifth level</a:t>
@@ -4196,7 +5103,9 @@
             </a:lvl9pPr>
           </a:lstStyle>
           <a:p>
-            <a:pPr lvl="0"/>
+            <a:pPr lvl="0">
+              <a:defRPr sz="2200"/>
+            </a:pPr>
             <a:r>
               <a:rPr lang="en-US"/>
               <a:t>Click to edit Master text styles</a:t>
@@ -4230,35 +5139,45 @@
           <a:bodyPr/>
           <a:lstStyle/>
           <a:p>
-            <a:pPr lvl="0"/>
+            <a:pPr lvl="0">
+              <a:defRPr sz="2200"/>
+            </a:pPr>
             <a:r>
               <a:rPr lang="en-US"/>
               <a:t>Click to edit Master text styles</a:t>
             </a:r>
           </a:p>
           <a:p>
-            <a:pPr lvl="1"/>
+            <a:pPr lvl="1">
+              <a:defRPr sz="1800"/>
+            </a:pPr>
             <a:r>
               <a:rPr lang="en-US"/>
               <a:t>Second level</a:t>
             </a:r>
           </a:p>
           <a:p>
-            <a:pPr lvl="2"/>
+            <a:pPr lvl="2">
+              <a:defRPr sz="1600"/>
+            </a:pPr>
             <a:r>
               <a:rPr lang="en-US"/>
               <a:t>Third level</a:t>
             </a:r>
           </a:p>
           <a:p>
-            <a:pPr lvl="3"/>
+            <a:pPr lvl="3">
+              <a:defRPr sz="1600"/>
+            </a:pPr>
             <a:r>
               <a:rPr lang="en-US"/>
               <a:t>Fourth level</a:t>
             </a:r>
           </a:p>
           <a:p>
-            <a:pPr lvl="4"/>
+            <a:pPr lvl="4">
+              <a:defRPr sz="1600"/>
+            </a:pPr>
             <a:r>
               <a:rPr lang="en-US"/>
               <a:t>Fifth level</a:t>
@@ -4288,9 +5207,12 @@
           <a:bodyPr/>
           <a:lstStyle/>
           <a:p>
+            <a:pPr>
+              <a:defRPr sz="2200"/>
+            </a:pPr>
             <a:fld id="{0CDDCF47-76FA-4B38-9020-A0E57F41036A}" type="datetimeFigureOut">
               <a:rPr lang="de-CH" smtClean="0"/>
-              <a:t>11.01.2026</a:t>
+              <a:t>13.01.2026</a:t>
             </a:fld>
             <a:endParaRPr lang="de-CH"/>
           </a:p>
@@ -4317,6 +5239,9 @@
           <a:bodyPr/>
           <a:lstStyle/>
           <a:p>
+            <a:pPr>
+              <a:defRPr sz="2200"/>
+            </a:pPr>
             <a:endParaRPr lang="de-CH"/>
           </a:p>
         </p:txBody>
@@ -4342,6 +5267,9 @@
           <a:bodyPr/>
           <a:lstStyle/>
           <a:p>
+            <a:pPr>
+              <a:defRPr sz="2200"/>
+            </a:pPr>
             <a:fld id="{EA2E0D3E-E818-438E-981B-E98523AC6CA8}" type="slidenum">
               <a:rPr lang="de-CH" smtClean="0"/>
               <a:t>‹#›</a:t>
@@ -4401,6 +5329,9 @@
           <a:bodyPr/>
           <a:lstStyle/>
           <a:p>
+            <a:pPr>
+              <a:defRPr sz="2200"/>
+            </a:pPr>
             <a:r>
               <a:rPr lang="en-US"/>
               <a:t>Click to edit Master title style</a:t>
@@ -4430,9 +5361,12 @@
           <a:bodyPr/>
           <a:lstStyle/>
           <a:p>
+            <a:pPr>
+              <a:defRPr sz="2200"/>
+            </a:pPr>
             <a:fld id="{0CDDCF47-76FA-4B38-9020-A0E57F41036A}" type="datetimeFigureOut">
               <a:rPr lang="de-CH" smtClean="0"/>
-              <a:t>11.01.2026</a:t>
+              <a:t>13.01.2026</a:t>
             </a:fld>
             <a:endParaRPr lang="de-CH"/>
           </a:p>
@@ -4459,6 +5393,9 @@
           <a:bodyPr/>
           <a:lstStyle/>
           <a:p>
+            <a:pPr>
+              <a:defRPr sz="2200"/>
+            </a:pPr>
             <a:endParaRPr lang="de-CH"/>
           </a:p>
         </p:txBody>
@@ -4484,6 +5421,9 @@
           <a:bodyPr/>
           <a:lstStyle/>
           <a:p>
+            <a:pPr>
+              <a:defRPr sz="2200"/>
+            </a:pPr>
             <a:fld id="{EA2E0D3E-E818-438E-981B-E98523AC6CA8}" type="slidenum">
               <a:rPr lang="de-CH" smtClean="0"/>
               <a:t>‹#›</a:t>
@@ -4543,9 +5483,12 @@
           <a:bodyPr/>
           <a:lstStyle/>
           <a:p>
+            <a:pPr>
+              <a:defRPr sz="2200"/>
+            </a:pPr>
             <a:fld id="{0CDDCF47-76FA-4B38-9020-A0E57F41036A}" type="datetimeFigureOut">
               <a:rPr lang="de-CH" smtClean="0"/>
-              <a:t>11.01.2026</a:t>
+              <a:t>13.01.2026</a:t>
             </a:fld>
             <a:endParaRPr lang="de-CH"/>
           </a:p>
@@ -4572,6 +5515,9 @@
           <a:bodyPr/>
           <a:lstStyle/>
           <a:p>
+            <a:pPr>
+              <a:defRPr sz="2200"/>
+            </a:pPr>
             <a:endParaRPr lang="de-CH"/>
           </a:p>
         </p:txBody>
@@ -4597,6 +5543,9 @@
           <a:bodyPr/>
           <a:lstStyle/>
           <a:p>
+            <a:pPr>
+              <a:defRPr sz="2200"/>
+            </a:pPr>
             <a:fld id="{EA2E0D3E-E818-438E-981B-E98523AC6CA8}" type="slidenum">
               <a:rPr lang="de-CH" smtClean="0"/>
               <a:t>‹#›</a:t>
@@ -4665,6 +5614,9 @@
             </a:lvl1pPr>
           </a:lstStyle>
           <a:p>
+            <a:pPr>
+              <a:defRPr sz="2200"/>
+            </a:pPr>
             <a:r>
               <a:rPr lang="en-US"/>
               <a:t>Click to edit Master title style</a:t>
@@ -4727,35 +5679,45 @@
             </a:lvl9pPr>
           </a:lstStyle>
           <a:p>
-            <a:pPr lvl="0"/>
+            <a:pPr lvl="0">
+              <a:defRPr sz="2200"/>
+            </a:pPr>
             <a:r>
               <a:rPr lang="en-US"/>
               <a:t>Click to edit Master text styles</a:t>
             </a:r>
           </a:p>
           <a:p>
-            <a:pPr lvl="1"/>
+            <a:pPr lvl="1">
+              <a:defRPr sz="1800"/>
+            </a:pPr>
             <a:r>
               <a:rPr lang="en-US"/>
               <a:t>Second level</a:t>
             </a:r>
           </a:p>
           <a:p>
-            <a:pPr lvl="2"/>
+            <a:pPr lvl="2">
+              <a:defRPr sz="1600"/>
+            </a:pPr>
             <a:r>
               <a:rPr lang="en-US"/>
               <a:t>Third level</a:t>
             </a:r>
           </a:p>
           <a:p>
-            <a:pPr lvl="3"/>
+            <a:pPr lvl="3">
+              <a:defRPr sz="1600"/>
+            </a:pPr>
             <a:r>
               <a:rPr lang="en-US"/>
               <a:t>Fourth level</a:t>
             </a:r>
           </a:p>
           <a:p>
-            <a:pPr lvl="4"/>
+            <a:pPr lvl="4">
+              <a:defRPr sz="1600"/>
+            </a:pPr>
             <a:r>
               <a:rPr lang="en-US"/>
               <a:t>Fifth level</a:t>
@@ -4827,7 +5789,9 @@
             </a:lvl9pPr>
           </a:lstStyle>
           <a:p>
-            <a:pPr lvl="0"/>
+            <a:pPr lvl="0">
+              <a:defRPr sz="2200"/>
+            </a:pPr>
             <a:r>
               <a:rPr lang="en-US"/>
               <a:t>Click to edit Master text styles</a:t>
@@ -4856,9 +5820,12 @@
           <a:bodyPr/>
           <a:lstStyle/>
           <a:p>
+            <a:pPr>
+              <a:defRPr sz="2200"/>
+            </a:pPr>
             <a:fld id="{0CDDCF47-76FA-4B38-9020-A0E57F41036A}" type="datetimeFigureOut">
               <a:rPr lang="de-CH" smtClean="0"/>
-              <a:t>11.01.2026</a:t>
+              <a:t>13.01.2026</a:t>
             </a:fld>
             <a:endParaRPr lang="de-CH"/>
           </a:p>
@@ -4885,6 +5852,9 @@
           <a:bodyPr/>
           <a:lstStyle/>
           <a:p>
+            <a:pPr>
+              <a:defRPr sz="2200"/>
+            </a:pPr>
             <a:endParaRPr lang="de-CH"/>
           </a:p>
         </p:txBody>
@@ -4910,6 +5880,9 @@
           <a:bodyPr/>
           <a:lstStyle/>
           <a:p>
+            <a:pPr>
+              <a:defRPr sz="2200"/>
+            </a:pPr>
             <a:fld id="{EA2E0D3E-E818-438E-981B-E98523AC6CA8}" type="slidenum">
               <a:rPr lang="de-CH" smtClean="0"/>
               <a:t>‹#›</a:t>
@@ -4978,6 +5951,9 @@
             </a:lvl1pPr>
           </a:lstStyle>
           <a:p>
+            <a:pPr>
+              <a:defRPr sz="2200"/>
+            </a:pPr>
             <a:r>
               <a:rPr lang="en-US"/>
               <a:t>Click to edit Master title style</a:t>
@@ -5049,6 +6025,9 @@
             </a:lvl9pPr>
           </a:lstStyle>
           <a:p>
+            <a:pPr>
+              <a:defRPr sz="2200"/>
+            </a:pPr>
             <a:endParaRPr lang="de-CH"/>
           </a:p>
         </p:txBody>
@@ -5116,7 +6095,9 @@
             </a:lvl9pPr>
           </a:lstStyle>
           <a:p>
-            <a:pPr lvl="0"/>
+            <a:pPr lvl="0">
+              <a:defRPr sz="2200"/>
+            </a:pPr>
             <a:r>
               <a:rPr lang="en-US"/>
               <a:t>Click to edit Master text styles</a:t>
@@ -5145,9 +6126,12 @@
           <a:bodyPr/>
           <a:lstStyle/>
           <a:p>
+            <a:pPr>
+              <a:defRPr sz="2200"/>
+            </a:pPr>
             <a:fld id="{0CDDCF47-76FA-4B38-9020-A0E57F41036A}" type="datetimeFigureOut">
               <a:rPr lang="de-CH" smtClean="0"/>
-              <a:t>11.01.2026</a:t>
+              <a:t>13.01.2026</a:t>
             </a:fld>
             <a:endParaRPr lang="de-CH"/>
           </a:p>
@@ -5174,6 +6158,9 @@
           <a:bodyPr/>
           <a:lstStyle/>
           <a:p>
+            <a:pPr>
+              <a:defRPr sz="2200"/>
+            </a:pPr>
             <a:endParaRPr lang="de-CH"/>
           </a:p>
         </p:txBody>
@@ -5199,6 +6186,9 @@
           <a:bodyPr/>
           <a:lstStyle/>
           <a:p>
+            <a:pPr>
+              <a:defRPr sz="2200"/>
+            </a:pPr>
             <a:fld id="{EA2E0D3E-E818-438E-981B-E98523AC6CA8}" type="slidenum">
               <a:rPr lang="de-CH" smtClean="0"/>
               <a:t>‹#›</a:t>
@@ -5221,7 +6211,7 @@
 </file>
 
 <file path=ppt/slideMasters/slideMaster1.xml><?xml version="1.0" encoding="utf-8"?>
-<p:sldMaster xmlns:a="http://schemas.openxmlformats.org/drawingml/2006/main" xmlns:p="http://schemas.openxmlformats.org/presentationml/2006/main" xmlns:r="http://schemas.openxmlformats.org/officeDocument/2006/relationships">
+<p:sldMaster xmlns:a="http://schemas.openxmlformats.org/drawingml/2006/main" xmlns:r="http://schemas.openxmlformats.org/officeDocument/2006/relationships" xmlns:p="http://schemas.openxmlformats.org/presentationml/2006/main">
   <p:cSld>
     <p:bg>
       <p:bgRef idx="1001">
@@ -5268,7 +6258,7 @@
           </a:prstGeom>
         </p:spPr>
         <p:txBody>
-          <a:bodyPr anchor="ctr" bIns="45720" lIns="91440" rIns="91440" rtlCol="0" tIns="45720" vert="horz">
+          <a:bodyPr vert="horz" lIns="91440" tIns="45720" rIns="91440" bIns="45720" rtlCol="0" anchor="ctr">
             <a:normAutofit/>
           </a:bodyPr>
           <a:lstStyle/>
@@ -5294,7 +6284,7 @@
             <a:spLocks noGrp="1"/>
           </p:cNvSpPr>
           <p:nvPr>
-            <p:ph idx="1" type="body"/>
+            <p:ph type="body" idx="1"/>
           </p:nvPr>
         </p:nvSpPr>
         <p:spPr>
@@ -5307,7 +6297,7 @@
           </a:prstGeom>
         </p:spPr>
         <p:txBody>
-          <a:bodyPr bIns="45720" lIns="91440" rIns="91440" rtlCol="0" tIns="45720" vert="horz">
+          <a:bodyPr vert="horz" lIns="91440" tIns="45720" rIns="91440" bIns="45720" rtlCol="0">
             <a:normAutofit/>
           </a:bodyPr>
           <a:lstStyle/>
@@ -5362,7 +6352,7 @@
             <a:spLocks noGrp="1"/>
           </p:cNvSpPr>
           <p:nvPr>
-            <p:ph idx="2" sz="half" type="dt"/>
+            <p:ph type="dt" sz="half" idx="2"/>
           </p:nvPr>
         </p:nvSpPr>
         <p:spPr>
@@ -5375,7 +6365,7 @@
           </a:prstGeom>
         </p:spPr>
         <p:txBody>
-          <a:bodyPr anchor="ctr" bIns="45720" lIns="91440" rIns="91440" rtlCol="0" tIns="45720" vert="horz"/>
+          <a:bodyPr vert="horz" lIns="91440" tIns="45720" rIns="91440" bIns="45720" rtlCol="0" anchor="ctr"/>
           <a:lstStyle>
             <a:lvl1pPr algn="l">
               <a:defRPr sz="1200">
@@ -5390,7 +6380,7 @@
           <a:p>
             <a:fld id="{0CDDCF47-76FA-4B38-9020-A0E57F41036A}" type="datetimeFigureOut">
               <a:rPr lang="de-CH" smtClean="0"/>
-              <a:t>11.01.2026</a:t>
+              <a:t>13.01.2026</a:t>
             </a:fld>
             <a:endParaRPr lang="de-CH"/>
           </a:p>
@@ -5409,7 +6399,7 @@
             <a:spLocks noGrp="1"/>
           </p:cNvSpPr>
           <p:nvPr>
-            <p:ph idx="3" sz="quarter" type="ftr"/>
+            <p:ph type="ftr" sz="quarter" idx="3"/>
           </p:nvPr>
         </p:nvSpPr>
         <p:spPr>
@@ -5422,7 +6412,7 @@
           </a:prstGeom>
         </p:spPr>
         <p:txBody>
-          <a:bodyPr anchor="ctr" bIns="45720" lIns="91440" rIns="91440" rtlCol="0" tIns="45720" vert="horz"/>
+          <a:bodyPr vert="horz" lIns="91440" tIns="45720" rIns="91440" bIns="45720" rtlCol="0" anchor="ctr"/>
           <a:lstStyle>
             <a:lvl1pPr algn="ctr">
               <a:defRPr sz="1200">
@@ -5452,7 +6442,7 @@
             <a:spLocks noGrp="1"/>
           </p:cNvSpPr>
           <p:nvPr>
-            <p:ph idx="4" sz="quarter" type="sldNum"/>
+            <p:ph type="sldNum" sz="quarter" idx="4"/>
           </p:nvPr>
         </p:nvSpPr>
         <p:spPr>
@@ -5465,7 +6455,7 @@
           </a:prstGeom>
         </p:spPr>
         <p:txBody>
-          <a:bodyPr anchor="ctr" bIns="45720" lIns="91440" rIns="91440" rtlCol="0" tIns="45720" vert="horz"/>
+          <a:bodyPr vert="horz" lIns="91440" tIns="45720" rIns="91440" bIns="45720" rtlCol="0" anchor="ctr"/>
           <a:lstStyle>
             <a:lvl1pPr algn="r">
               <a:defRPr sz="1200">
@@ -5493,7 +6483,7 @@
       </p:ext>
     </p:extLst>
   </p:cSld>
-  <p:clrMap accent1="accent1" accent2="accent2" accent3="accent3" accent4="accent4" accent5="accent5" accent6="accent6" bg1="lt1" bg2="lt2" folHlink="folHlink" hlink="hlink" tx1="dk1" tx2="dk2"/>
+  <p:clrMap bg1="lt1" tx1="dk1" bg2="lt2" tx2="dk2" accent1="accent1" accent2="accent2" accent3="accent3" accent4="accent4" accent5="accent5" accent6="accent6" hlink="hlink" folHlink="folHlink"/>
   <p:sldLayoutIdLst>
     <p:sldLayoutId id="2147483649" r:id="rId1"/>
     <p:sldLayoutId id="2147483650" r:id="rId2"/>
@@ -5513,7 +6503,7 @@
   </p:sldLayoutIdLst>
   <p:txStyles>
     <p:titleStyle>
-      <a:lvl1pPr algn="l" defTabSz="914400" eaLnBrk="1" hangingPunct="1" latinLnBrk="0" rtl="0">
+      <a:lvl1pPr algn="l" defTabSz="914400" rtl="0" eaLnBrk="1" latinLnBrk="0" hangingPunct="1">
         <a:lnSpc>
           <a:spcPct val="90000"/>
         </a:lnSpc>
@@ -5521,7 +6511,7 @@
           <a:spcPct val="0"/>
         </a:spcBef>
         <a:buNone/>
-        <a:defRPr kern="1200" sz="4400">
+        <a:defRPr sz="4400" kern="1200">
           <a:solidFill>
             <a:schemeClr val="tx1"/>
           </a:solidFill>
@@ -5532,16 +6522,16 @@
       </a:lvl1pPr>
     </p:titleStyle>
     <p:bodyStyle>
-      <a:lvl1pPr algn="l" defTabSz="914400" eaLnBrk="1" hangingPunct="1" indent="-228600" latinLnBrk="0" marL="228600" rtl="0">
+      <a:lvl1pPr marL="228600" indent="-228600" algn="l" defTabSz="914400" rtl="0" eaLnBrk="1" latinLnBrk="0" hangingPunct="1">
         <a:lnSpc>
           <a:spcPct val="90000"/>
         </a:lnSpc>
         <a:spcBef>
           <a:spcPts val="1000"/>
         </a:spcBef>
-        <a:buFont charset="0" panose="020B0604020202020204" pitchFamily="34" typeface="Arial"/>
+        <a:buFont typeface="Arial" panose="020B0604020202020204" pitchFamily="34" charset="0"/>
         <a:buChar char="•"/>
-        <a:defRPr kern="1200" sz="2800">
+        <a:defRPr sz="2800" kern="1200">
           <a:solidFill>
             <a:schemeClr val="tx1"/>
           </a:solidFill>
@@ -5550,16 +6540,16 @@
           <a:cs typeface="+mn-cs"/>
         </a:defRPr>
       </a:lvl1pPr>
-      <a:lvl2pPr algn="l" defTabSz="914400" eaLnBrk="1" hangingPunct="1" indent="-228600" latinLnBrk="0" marL="685800" rtl="0">
+      <a:lvl2pPr marL="685800" indent="-228600" algn="l" defTabSz="914400" rtl="0" eaLnBrk="1" latinLnBrk="0" hangingPunct="1">
         <a:lnSpc>
           <a:spcPct val="90000"/>
         </a:lnSpc>
         <a:spcBef>
           <a:spcPts val="500"/>
         </a:spcBef>
-        <a:buFont charset="0" panose="020B0604020202020204" pitchFamily="34" typeface="Arial"/>
+        <a:buFont typeface="Arial" panose="020B0604020202020204" pitchFamily="34" charset="0"/>
         <a:buChar char="•"/>
-        <a:defRPr kern="1200" sz="2400">
+        <a:defRPr sz="2400" kern="1200">
           <a:solidFill>
             <a:schemeClr val="tx1"/>
           </a:solidFill>
@@ -5568,16 +6558,16 @@
           <a:cs typeface="+mn-cs"/>
         </a:defRPr>
       </a:lvl2pPr>
-      <a:lvl3pPr algn="l" defTabSz="914400" eaLnBrk="1" hangingPunct="1" indent="-228600" latinLnBrk="0" marL="1143000" rtl="0">
+      <a:lvl3pPr marL="1143000" indent="-228600" algn="l" defTabSz="914400" rtl="0" eaLnBrk="1" latinLnBrk="0" hangingPunct="1">
         <a:lnSpc>
           <a:spcPct val="90000"/>
         </a:lnSpc>
         <a:spcBef>
           <a:spcPts val="500"/>
         </a:spcBef>
-        <a:buFont charset="0" panose="020B0604020202020204" pitchFamily="34" typeface="Arial"/>
+        <a:buFont typeface="Arial" panose="020B0604020202020204" pitchFamily="34" charset="0"/>
         <a:buChar char="•"/>
-        <a:defRPr kern="1200" sz="2000">
+        <a:defRPr sz="2000" kern="1200">
           <a:solidFill>
             <a:schemeClr val="tx1"/>
           </a:solidFill>
@@ -5586,16 +6576,16 @@
           <a:cs typeface="+mn-cs"/>
         </a:defRPr>
       </a:lvl3pPr>
-      <a:lvl4pPr algn="l" defTabSz="914400" eaLnBrk="1" hangingPunct="1" indent="-228600" latinLnBrk="0" marL="1600200" rtl="0">
+      <a:lvl4pPr marL="1600200" indent="-228600" algn="l" defTabSz="914400" rtl="0" eaLnBrk="1" latinLnBrk="0" hangingPunct="1">
         <a:lnSpc>
           <a:spcPct val="90000"/>
         </a:lnSpc>
         <a:spcBef>
           <a:spcPts val="500"/>
         </a:spcBef>
-        <a:buFont charset="0" panose="020B0604020202020204" pitchFamily="34" typeface="Arial"/>
+        <a:buFont typeface="Arial" panose="020B0604020202020204" pitchFamily="34" charset="0"/>
         <a:buChar char="•"/>
-        <a:defRPr kern="1200" sz="1800">
+        <a:defRPr sz="1800" kern="1200">
           <a:solidFill>
             <a:schemeClr val="tx1"/>
           </a:solidFill>
@@ -5604,16 +6594,16 @@
           <a:cs typeface="+mn-cs"/>
         </a:defRPr>
       </a:lvl4pPr>
-      <a:lvl5pPr algn="l" defTabSz="914400" eaLnBrk="1" hangingPunct="1" indent="-228600" latinLnBrk="0" marL="2057400" rtl="0">
+      <a:lvl5pPr marL="2057400" indent="-228600" algn="l" defTabSz="914400" rtl="0" eaLnBrk="1" latinLnBrk="0" hangingPunct="1">
         <a:lnSpc>
           <a:spcPct val="90000"/>
         </a:lnSpc>
         <a:spcBef>
           <a:spcPts val="500"/>
         </a:spcBef>
-        <a:buFont charset="0" panose="020B0604020202020204" pitchFamily="34" typeface="Arial"/>
+        <a:buFont typeface="Arial" panose="020B0604020202020204" pitchFamily="34" charset="0"/>
         <a:buChar char="•"/>
-        <a:defRPr kern="1200" sz="1800">
+        <a:defRPr sz="1800" kern="1200">
           <a:solidFill>
             <a:schemeClr val="tx1"/>
           </a:solidFill>
@@ -5622,16 +6612,16 @@
           <a:cs typeface="+mn-cs"/>
         </a:defRPr>
       </a:lvl5pPr>
-      <a:lvl6pPr algn="l" defTabSz="914400" eaLnBrk="1" hangingPunct="1" indent="-228600" latinLnBrk="0" marL="2514600" rtl="0">
+      <a:lvl6pPr marL="2514600" indent="-228600" algn="l" defTabSz="914400" rtl="0" eaLnBrk="1" latinLnBrk="0" hangingPunct="1">
         <a:lnSpc>
           <a:spcPct val="90000"/>
         </a:lnSpc>
         <a:spcBef>
           <a:spcPts val="500"/>
         </a:spcBef>
-        <a:buFont charset="0" panose="020B0604020202020204" pitchFamily="34" typeface="Arial"/>
+        <a:buFont typeface="Arial" panose="020B0604020202020204" pitchFamily="34" charset="0"/>
         <a:buChar char="•"/>
-        <a:defRPr kern="1200" sz="1800">
+        <a:defRPr sz="1800" kern="1200">
           <a:solidFill>
             <a:schemeClr val="tx1"/>
           </a:solidFill>
@@ -5640,16 +6630,16 @@
           <a:cs typeface="+mn-cs"/>
         </a:defRPr>
       </a:lvl6pPr>
-      <a:lvl7pPr algn="l" defTabSz="914400" eaLnBrk="1" hangingPunct="1" indent="-228600" latinLnBrk="0" marL="2971800" rtl="0">
+      <a:lvl7pPr marL="2971800" indent="-228600" algn="l" defTabSz="914400" rtl="0" eaLnBrk="1" latinLnBrk="0" hangingPunct="1">
         <a:lnSpc>
           <a:spcPct val="90000"/>
         </a:lnSpc>
         <a:spcBef>
           <a:spcPts val="500"/>
         </a:spcBef>
-        <a:buFont charset="0" panose="020B0604020202020204" pitchFamily="34" typeface="Arial"/>
+        <a:buFont typeface="Arial" panose="020B0604020202020204" pitchFamily="34" charset="0"/>
         <a:buChar char="•"/>
-        <a:defRPr kern="1200" sz="1800">
+        <a:defRPr sz="1800" kern="1200">
           <a:solidFill>
             <a:schemeClr val="tx1"/>
           </a:solidFill>
@@ -5658,16 +6648,16 @@
           <a:cs typeface="+mn-cs"/>
         </a:defRPr>
       </a:lvl7pPr>
-      <a:lvl8pPr algn="l" defTabSz="914400" eaLnBrk="1" hangingPunct="1" indent="-228600" latinLnBrk="0" marL="3429000" rtl="0">
+      <a:lvl8pPr marL="3429000" indent="-228600" algn="l" defTabSz="914400" rtl="0" eaLnBrk="1" latinLnBrk="0" hangingPunct="1">
         <a:lnSpc>
           <a:spcPct val="90000"/>
         </a:lnSpc>
         <a:spcBef>
           <a:spcPts val="500"/>
         </a:spcBef>
-        <a:buFont charset="0" panose="020B0604020202020204" pitchFamily="34" typeface="Arial"/>
+        <a:buFont typeface="Arial" panose="020B0604020202020204" pitchFamily="34" charset="0"/>
         <a:buChar char="•"/>
-        <a:defRPr kern="1200" sz="1800">
+        <a:defRPr sz="1800" kern="1200">
           <a:solidFill>
             <a:schemeClr val="tx1"/>
           </a:solidFill>
@@ -5676,16 +6666,16 @@
           <a:cs typeface="+mn-cs"/>
         </a:defRPr>
       </a:lvl8pPr>
-      <a:lvl9pPr algn="l" defTabSz="914400" eaLnBrk="1" hangingPunct="1" indent="-228600" latinLnBrk="0" marL="3886200" rtl="0">
+      <a:lvl9pPr marL="3886200" indent="-228600" algn="l" defTabSz="914400" rtl="0" eaLnBrk="1" latinLnBrk="0" hangingPunct="1">
         <a:lnSpc>
           <a:spcPct val="90000"/>
         </a:lnSpc>
         <a:spcBef>
           <a:spcPts val="500"/>
         </a:spcBef>
-        <a:buFont charset="0" panose="020B0604020202020204" pitchFamily="34" typeface="Arial"/>
+        <a:buFont typeface="Arial" panose="020B0604020202020204" pitchFamily="34" charset="0"/>
         <a:buChar char="•"/>
-        <a:defRPr kern="1200" sz="1800">
+        <a:defRPr sz="1800" kern="1200">
           <a:solidFill>
             <a:schemeClr val="tx1"/>
           </a:solidFill>
@@ -5699,8 +6689,8 @@
       <a:defPPr>
         <a:defRPr lang="de-DE"/>
       </a:defPPr>
-      <a:lvl1pPr algn="l" defTabSz="914400" eaLnBrk="1" hangingPunct="1" latinLnBrk="0" marL="0" rtl="0">
-        <a:defRPr kern="1200" sz="1800">
+      <a:lvl1pPr marL="0" algn="l" defTabSz="914400" rtl="0" eaLnBrk="1" latinLnBrk="0" hangingPunct="1">
+        <a:defRPr sz="1800" kern="1200">
           <a:solidFill>
             <a:schemeClr val="tx1"/>
           </a:solidFill>
@@ -5709,8 +6699,8 @@
           <a:cs typeface="+mn-cs"/>
         </a:defRPr>
       </a:lvl1pPr>
-      <a:lvl2pPr algn="l" defTabSz="914400" eaLnBrk="1" hangingPunct="1" latinLnBrk="0" marL="457200" rtl="0">
-        <a:defRPr kern="1200" sz="1800">
+      <a:lvl2pPr marL="457200" algn="l" defTabSz="914400" rtl="0" eaLnBrk="1" latinLnBrk="0" hangingPunct="1">
+        <a:defRPr sz="1800" kern="1200">
           <a:solidFill>
             <a:schemeClr val="tx1"/>
           </a:solidFill>
@@ -5719,8 +6709,8 @@
           <a:cs typeface="+mn-cs"/>
         </a:defRPr>
       </a:lvl2pPr>
-      <a:lvl3pPr algn="l" defTabSz="914400" eaLnBrk="1" hangingPunct="1" latinLnBrk="0" marL="914400" rtl="0">
-        <a:defRPr kern="1200" sz="1800">
+      <a:lvl3pPr marL="914400" algn="l" defTabSz="914400" rtl="0" eaLnBrk="1" latinLnBrk="0" hangingPunct="1">
+        <a:defRPr sz="1800" kern="1200">
           <a:solidFill>
             <a:schemeClr val="tx1"/>
           </a:solidFill>
@@ -5729,8 +6719,8 @@
           <a:cs typeface="+mn-cs"/>
         </a:defRPr>
       </a:lvl3pPr>
-      <a:lvl4pPr algn="l" defTabSz="914400" eaLnBrk="1" hangingPunct="1" latinLnBrk="0" marL="1371600" rtl="0">
-        <a:defRPr kern="1200" sz="1800">
+      <a:lvl4pPr marL="1371600" algn="l" defTabSz="914400" rtl="0" eaLnBrk="1" latinLnBrk="0" hangingPunct="1">
+        <a:defRPr sz="1800" kern="1200">
           <a:solidFill>
             <a:schemeClr val="tx1"/>
           </a:solidFill>
@@ -5739,8 +6729,8 @@
           <a:cs typeface="+mn-cs"/>
         </a:defRPr>
       </a:lvl4pPr>
-      <a:lvl5pPr algn="l" defTabSz="914400" eaLnBrk="1" hangingPunct="1" latinLnBrk="0" marL="1828800" rtl="0">
-        <a:defRPr kern="1200" sz="1800">
+      <a:lvl5pPr marL="1828800" algn="l" defTabSz="914400" rtl="0" eaLnBrk="1" latinLnBrk="0" hangingPunct="1">
+        <a:defRPr sz="1800" kern="1200">
           <a:solidFill>
             <a:schemeClr val="tx1"/>
           </a:solidFill>
@@ -5749,8 +6739,8 @@
           <a:cs typeface="+mn-cs"/>
         </a:defRPr>
       </a:lvl5pPr>
-      <a:lvl6pPr algn="l" defTabSz="914400" eaLnBrk="1" hangingPunct="1" latinLnBrk="0" marL="2286000" rtl="0">
-        <a:defRPr kern="1200" sz="1800">
+      <a:lvl6pPr marL="2286000" algn="l" defTabSz="914400" rtl="0" eaLnBrk="1" latinLnBrk="0" hangingPunct="1">
+        <a:defRPr sz="1800" kern="1200">
           <a:solidFill>
             <a:schemeClr val="tx1"/>
           </a:solidFill>
@@ -5759,8 +6749,8 @@
           <a:cs typeface="+mn-cs"/>
         </a:defRPr>
       </a:lvl6pPr>
-      <a:lvl7pPr algn="l" defTabSz="914400" eaLnBrk="1" hangingPunct="1" latinLnBrk="0" marL="2743200" rtl="0">
-        <a:defRPr kern="1200" sz="1800">
+      <a:lvl7pPr marL="2743200" algn="l" defTabSz="914400" rtl="0" eaLnBrk="1" latinLnBrk="0" hangingPunct="1">
+        <a:defRPr sz="1800" kern="1200">
           <a:solidFill>
             <a:schemeClr val="tx1"/>
           </a:solidFill>
@@ -5769,8 +6759,8 @@
           <a:cs typeface="+mn-cs"/>
         </a:defRPr>
       </a:lvl7pPr>
-      <a:lvl8pPr algn="l" defTabSz="914400" eaLnBrk="1" hangingPunct="1" latinLnBrk="0" marL="3200400" rtl="0">
-        <a:defRPr kern="1200" sz="1800">
+      <a:lvl8pPr marL="3200400" algn="l" defTabSz="914400" rtl="0" eaLnBrk="1" latinLnBrk="0" hangingPunct="1">
+        <a:defRPr sz="1800" kern="1200">
           <a:solidFill>
             <a:schemeClr val="tx1"/>
           </a:solidFill>
@@ -5779,8 +6769,8 @@
           <a:cs typeface="+mn-cs"/>
         </a:defRPr>
       </a:lvl8pPr>
-      <a:lvl9pPr algn="l" defTabSz="914400" eaLnBrk="1" hangingPunct="1" latinLnBrk="0" marL="3657600" rtl="0">
-        <a:defRPr kern="1200" sz="1800">
+      <a:lvl9pPr marL="3657600" algn="l" defTabSz="914400" rtl="0" eaLnBrk="1" latinLnBrk="0" hangingPunct="1">
+        <a:defRPr sz="1800" kern="1200">
           <a:solidFill>
             <a:schemeClr val="tx1"/>
           </a:solidFill>
@@ -5837,18 +6827,20 @@
           <a:bodyPr/>
           <a:lstStyle/>
           <a:p>
-            <a:pPr lvl="0" indent="0" marL="0">
-              <a:buNone/>
-            </a:pPr>
-            <a:r>
-              <a:rPr/>
-              <a:t>Software Development mit AI</a:t>
+            <a:pPr marL="0" lvl="0" indent="0">
+              <a:buNone/>
+            </a:pPr>
+            <a:r>
+              <a:t>_</a:t>
             </a:r>
           </a:p>
         </p:txBody>
       </p:sp>
     </p:spTree>
   </p:cSld>
+  <p:clrMapOvr>
+    <a:masterClrMapping/>
+  </p:clrMapOvr>
 </p:sld>
 </file>
 
@@ -5890,12 +6882,11 @@
           <a:bodyPr/>
           <a:lstStyle/>
           <a:p>
-            <a:pPr lvl="0" indent="0" marL="0">
-              <a:buNone/>
-            </a:pPr>
-            <a:r>
-              <a:rPr/>
-              <a:t>KI-gestützte Entwicklung mit Junie (IDE-zentriert)</a:t>
+            <a:pPr marL="0" lvl="0" indent="0">
+              <a:buNone/>
+            </a:pPr>
+            <a:r>
+              <a:t>ChatGPT (extern &amp; beratend)</a:t>
             </a:r>
           </a:p>
         </p:txBody>
@@ -5923,35 +6914,34 @@
           <a:p>
             <a:pPr lvl="0"/>
             <a:r>
-              <a:rPr/>
-              <a:t>Direkte IDE-Integration</a:t>
+              <a:t>Architektur- &amp; UX-Feedback</a:t>
             </a:r>
           </a:p>
           <a:p>
             <a:pPr lvl="0"/>
             <a:r>
-              <a:rPr/>
-              <a:t>Kontext aus Projekt &amp; Code</a:t>
+              <a:t>Alternative Lösungsansätze</a:t>
             </a:r>
           </a:p>
           <a:p>
             <a:pPr lvl="0"/>
             <a:r>
-              <a:rPr/>
-              <a:t>Schnelle Iterationen</a:t>
+              <a:t>Formulierung &amp; Dokumentation</a:t>
             </a:r>
           </a:p>
           <a:p>
             <a:pPr lvl="0"/>
             <a:r>
-              <a:rPr/>
-              <a:t>Fokus auf Implementierung</a:t>
+              <a:t>Kein direkter Code-Zugriff</a:t>
             </a:r>
           </a:p>
         </p:txBody>
       </p:sp>
     </p:spTree>
   </p:cSld>
+  <p:clrMapOvr>
+    <a:masterClrMapping/>
+  </p:clrMapOvr>
 </p:sld>
 </file>
 
@@ -5993,12 +6983,11 @@
           <a:bodyPr/>
           <a:lstStyle/>
           <a:p>
-            <a:pPr lvl="0" indent="0" marL="0">
-              <a:buNone/>
-            </a:pPr>
-            <a:r>
-              <a:rPr/>
-              <a:t>ChatGPT (extern &amp; beratend)</a:t>
+            <a:pPr marL="0" lvl="0" indent="0">
+              <a:buNone/>
+            </a:pPr>
+            <a:r>
+              <a:t>Einschränkungen im Firmenumfeld</a:t>
             </a:r>
           </a:p>
         </p:txBody>
@@ -6026,35 +7015,62 @@
           <a:p>
             <a:pPr lvl="0"/>
             <a:r>
-              <a:rPr/>
-              <a:t>Architektur- &amp; UX-Feedback</a:t>
+              <a:rPr b="1"/>
+              <a:t>Security &amp; Compliance</a:t>
+            </a:r>
+          </a:p>
+          <a:p>
+            <a:pPr lvl="1"/>
+            <a:r>
+              <a:t>Keine Kundendaten extern</a:t>
             </a:r>
           </a:p>
           <a:p>
             <a:pPr lvl="0"/>
             <a:r>
-              <a:rPr/>
-              <a:t>Alternative Lösungsansätze</a:t>
+              <a:rPr b="1"/>
+              <a:t>Tool-Vorgaben</a:t>
+            </a:r>
+          </a:p>
+          <a:p>
+            <a:pPr lvl="1"/>
+            <a:r>
+              <a:t>Zentrale AI-Freigaben</a:t>
             </a:r>
           </a:p>
           <a:p>
             <a:pPr lvl="0"/>
             <a:r>
-              <a:rPr/>
-              <a:t>Formulierung &amp; Dokumentation</a:t>
+              <a:rPr b="1"/>
+              <a:t>Technologie-Gap</a:t>
+            </a:r>
+          </a:p>
+          <a:p>
+            <a:pPr lvl="1"/>
+            <a:r>
+              <a:t>Verzögerter Zugang zu aktuellen Modellen</a:t>
             </a:r>
           </a:p>
           <a:p>
             <a:pPr lvl="0"/>
             <a:r>
-              <a:rPr/>
-              <a:t>Kein direkter Code-Zugriff</a:t>
+              <a:rPr b="1"/>
+              <a:t>Know-how</a:t>
+            </a:r>
+          </a:p>
+          <a:p>
+            <a:pPr lvl="1"/>
+            <a:r>
+              <a:t>Prompting-Kompetenz nötig</a:t>
             </a:r>
           </a:p>
         </p:txBody>
       </p:sp>
     </p:spTree>
   </p:cSld>
+  <p:clrMapOvr>
+    <a:masterClrMapping/>
+  </p:clrMapOvr>
 </p:sld>
 </file>
 
@@ -6096,12 +7112,11 @@
           <a:bodyPr/>
           <a:lstStyle/>
           <a:p>
-            <a:pPr lvl="0" indent="0" marL="0">
-              <a:buNone/>
-            </a:pPr>
-            <a:r>
-              <a:rPr/>
-              <a:t>Einschränkungen im Firmenumfeld</a:t>
+            <a:pPr marL="0" lvl="0" indent="0">
+              <a:buNone/>
+            </a:pPr>
+            <a:r>
+              <a:t>Fazit</a:t>
             </a:r>
           </a:p>
         </p:txBody>
@@ -6130,141 +7145,9 @@
             <a:pPr lvl="0"/>
             <a:r>
               <a:rPr b="1"/>
-              <a:t>Security &amp; Compliance</a:t>
-            </a:r>
-          </a:p>
-          <a:p>
-            <a:pPr lvl="1"/>
-            <a:r>
-              <a:rPr/>
-              <a:t>Keine Kundendaten extern</a:t>
-            </a:r>
-          </a:p>
-          <a:p>
-            <a:pPr lvl="0"/>
-            <a:r>
-              <a:rPr b="1"/>
-              <a:t>Tool-Vorgaben</a:t>
-            </a:r>
-          </a:p>
-          <a:p>
-            <a:pPr lvl="1"/>
-            <a:r>
-              <a:rPr/>
-              <a:t>Zentrale AI-Freigaben</a:t>
-            </a:r>
-          </a:p>
-          <a:p>
-            <a:pPr lvl="0"/>
-            <a:r>
-              <a:rPr b="1"/>
-              <a:t>Technologie-Gap</a:t>
-            </a:r>
-          </a:p>
-          <a:p>
-            <a:pPr lvl="1"/>
-            <a:r>
-              <a:rPr/>
-              <a:t>Verzögerter Zugang zu aktuellen Modellen</a:t>
-            </a:r>
-          </a:p>
-          <a:p>
-            <a:pPr lvl="0"/>
-            <a:r>
-              <a:rPr b="1"/>
-              <a:t>Know-how</a:t>
-            </a:r>
-          </a:p>
-          <a:p>
-            <a:pPr lvl="1"/>
-            <a:r>
-              <a:rPr/>
-              <a:t>Prompting-Kompetenz nötig</a:t>
-            </a:r>
-          </a:p>
-        </p:txBody>
-      </p:sp>
-    </p:spTree>
-  </p:cSld>
-</p:sld>
-</file>
-
-<file path=ppt/slides/slide13.xml><?xml version="1.0" encoding="utf-8"?>
-<p:sld xmlns:a="http://schemas.openxmlformats.org/drawingml/2006/main" xmlns:r="http://schemas.openxmlformats.org/officeDocument/2006/relationships" xmlns:p="http://schemas.openxmlformats.org/presentationml/2006/main">
-  <p:cSld>
-    <p:spTree>
-      <p:nvGrpSpPr>
-        <p:cNvPr id="1" name=""/>
-        <p:cNvGrpSpPr/>
-        <p:nvPr/>
-      </p:nvGrpSpPr>
-      <p:grpSpPr>
-        <a:xfrm>
-          <a:off x="0" y="0"/>
-          <a:ext cx="0" cy="0"/>
-          <a:chOff x="0" y="0"/>
-          <a:chExt cx="0" cy="0"/>
-        </a:xfrm>
-      </p:grpSpPr>
-      <p:sp>
-        <p:nvSpPr>
-          <p:cNvPr id="2" name="Title 1">
-            <a:extLst>
-              <a:ext uri="{FF2B5EF4-FFF2-40B4-BE49-F238E27FC236}">
-                <a16:creationId xmlns:a16="http://schemas.microsoft.com/office/drawing/2014/main" id="{8676017A-D490-C525-5E87-B6C1AF2B5EEE}"/>
-              </a:ext>
-            </a:extLst>
-          </p:cNvPr>
-          <p:cNvSpPr>
-            <a:spLocks noGrp="1"/>
-          </p:cNvSpPr>
-          <p:nvPr>
-            <p:ph type="title"/>
-          </p:nvPr>
-        </p:nvSpPr>
-        <p:spPr/>
-        <p:txBody>
-          <a:bodyPr/>
-          <a:lstStyle/>
-          <a:p>
-            <a:pPr lvl="0" indent="0" marL="0">
-              <a:buNone/>
-            </a:pPr>
-            <a:r>
-              <a:rPr/>
-              <a:t>Fazit</a:t>
-            </a:r>
-          </a:p>
-        </p:txBody>
-      </p:sp>
-      <p:sp>
-        <p:nvSpPr>
-          <p:cNvPr id="3" name="Content Placeholder 2">
-            <a:extLst>
-              <a:ext uri="{FF2B5EF4-FFF2-40B4-BE49-F238E27FC236}">
-                <a16:creationId xmlns:a16="http://schemas.microsoft.com/office/drawing/2014/main" id="{8474243A-9EC3-DC90-DD30-786D6071319D}"/>
-              </a:ext>
-            </a:extLst>
-          </p:cNvPr>
-          <p:cNvSpPr>
-            <a:spLocks noGrp="1"/>
-          </p:cNvSpPr>
-          <p:nvPr>
-            <p:ph idx="1"/>
-          </p:nvPr>
-        </p:nvSpPr>
-        <p:spPr/>
-        <p:txBody>
-          <a:bodyPr/>
-          <a:lstStyle/>
-          <a:p>
-            <a:pPr lvl="0"/>
-            <a:r>
-              <a:rPr b="1"/>
               <a:t>Demo bestätigt</a:t>
             </a:r>
             <a:r>
-              <a:rPr/>
               <a:t>: AI ist produktionsreif</a:t>
             </a:r>
           </a:p>
@@ -6275,7 +7158,6 @@
               <a:t>Werkzeuge</a:t>
             </a:r>
             <a:r>
-              <a:rPr/>
               <a:t>: Junie &amp; ChatGPT ergänzen sich ideal</a:t>
             </a:r>
           </a:p>
@@ -6286,7 +7168,6 @@
               <a:t>Praxis</a:t>
             </a:r>
             <a:r>
-              <a:rPr/>
               <a:t>: Weniger Code, mehr Qualität</a:t>
             </a:r>
           </a:p>
@@ -6297,12 +7178,11 @@
               <a:t>Ausblick</a:t>
             </a:r>
             <a:r>
-              <a:rPr/>
               <a:t>: AI-gestützte Entwicklung wird Standard</a:t>
             </a:r>
           </a:p>
           <a:p>
-            <a:pPr lvl="0" indent="0" marL="0">
+            <a:pPr marL="0" lvl="0" indent="0">
               <a:spcBef>
                 <a:spcPts val="3000"/>
               </a:spcBef>
@@ -6314,7 +7194,7 @@
             </a:r>
           </a:p>
           <a:p>
-            <a:pPr lvl="0" indent="0" marL="0">
+            <a:pPr marL="0" lvl="0" indent="0">
               <a:spcBef>
                 <a:spcPts val="3000"/>
               </a:spcBef>
@@ -6329,6 +7209,9 @@
       </p:sp>
     </p:spTree>
   </p:cSld>
+  <p:clrMapOvr>
+    <a:masterClrMapping/>
+  </p:clrMapOvr>
 </p:sld>
 </file>
 
@@ -6351,18 +7234,18 @@
       </p:grpSpPr>
       <p:sp>
         <p:nvSpPr>
-          <p:cNvPr id="3" name="Content Placeholder 2">
-            <a:extLst>
-              <a:ext uri="{FF2B5EF4-FFF2-40B4-BE49-F238E27FC236}">
-                <a16:creationId xmlns:a16="http://schemas.microsoft.com/office/drawing/2014/main" id="{8474243A-9EC3-DC90-DD30-786D6071319D}"/>
-              </a:ext>
-            </a:extLst>
-          </p:cNvPr>
-          <p:cNvSpPr>
-            <a:spLocks noGrp="1"/>
-          </p:cNvSpPr>
-          <p:nvPr>
-            <p:ph idx="1"/>
+          <p:cNvPr id="2" name="Title 1">
+            <a:extLst>
+              <a:ext uri="{FF2B5EF4-FFF2-40B4-BE49-F238E27FC236}">
+                <a16:creationId xmlns:a16="http://schemas.microsoft.com/office/drawing/2014/main" id="{8676017A-D490-C525-5E87-B6C1AF2B5EEE}"/>
+              </a:ext>
+            </a:extLst>
+          </p:cNvPr>
+          <p:cNvSpPr>
+            <a:spLocks noGrp="1"/>
+          </p:cNvSpPr>
+          <p:nvPr>
+            <p:ph type="title"/>
           </p:nvPr>
         </p:nvSpPr>
         <p:spPr/>
@@ -6370,77 +7253,94 @@
           <a:bodyPr/>
           <a:lstStyle/>
           <a:p>
-            <a:pPr lvl="0" indent="0" marL="0">
-              <a:spcBef>
-                <a:spcPts val="3000"/>
-              </a:spcBef>
-              <a:buNone/>
-            </a:pPr>
+            <a:pPr marL="0" lvl="0" indent="0">
+              <a:buNone/>
+            </a:pPr>
+            <a:r>
+              <a:t>Agenda</a:t>
+            </a:r>
+          </a:p>
+        </p:txBody>
+      </p:sp>
+      <p:sp>
+        <p:nvSpPr>
+          <p:cNvPr id="3" name="Content Placeholder 2">
+            <a:extLst>
+              <a:ext uri="{FF2B5EF4-FFF2-40B4-BE49-F238E27FC236}">
+                <a16:creationId xmlns:a16="http://schemas.microsoft.com/office/drawing/2014/main" id="{8474243A-9EC3-DC90-DD30-786D6071319D}"/>
+              </a:ext>
+            </a:extLst>
+          </p:cNvPr>
+          <p:cNvSpPr>
+            <a:spLocks noGrp="1"/>
+          </p:cNvSpPr>
+          <p:nvPr>
+            <p:ph idx="1"/>
+          </p:nvPr>
+        </p:nvSpPr>
+        <p:spPr/>
+        <p:txBody>
+          <a:bodyPr/>
+          <a:lstStyle/>
+          <a:p>
+            <a:pPr lvl="0"/>
             <a:r>
               <a:rPr b="1"/>
-              <a:t>Agenda</a:t>
+              <a:t>Demo &amp; Kontext</a:t>
+            </a:r>
+          </a:p>
+          <a:p>
+            <a:pPr lvl="1"/>
+            <a:r>
+              <a:t>Angular Web &amp; Android App</a:t>
             </a:r>
           </a:p>
           <a:p>
             <a:pPr lvl="0"/>
             <a:r>
-              <a:rPr/>
-              <a:t>Anwendungsübersicht</a:t>
+              <a:rPr b="1"/>
+              <a:t>AI-Werkzeuge</a:t>
+            </a:r>
+          </a:p>
+          <a:p>
+            <a:pPr lvl="1"/>
+            <a:r>
+              <a:t>Junie AI, ChatGPT</a:t>
             </a:r>
           </a:p>
           <a:p>
             <a:pPr lvl="0"/>
             <a:r>
-              <a:rPr/>
-              <a:t>Architekturübersicht – Logisch</a:t>
+              <a:rPr b="1"/>
+              <a:t>Praxis</a:t>
+            </a:r>
+          </a:p>
+          <a:p>
+            <a:pPr lvl="1"/>
+            <a:r>
+              <a:t>Vorgehensweise &amp; Beispiele</a:t>
             </a:r>
           </a:p>
           <a:p>
             <a:pPr lvl="0"/>
             <a:r>
-              <a:rPr/>
-              <a:t>Architekturübersicht – Infrastruktur</a:t>
-            </a:r>
-          </a:p>
-          <a:p>
-            <a:pPr lvl="0"/>
-            <a:r>
-              <a:rPr/>
-              <a:t>AI Toolset</a:t>
-            </a:r>
-          </a:p>
-          <a:p>
-            <a:pPr lvl="0"/>
-            <a:r>
-              <a:rPr/>
-              <a:t>Vorgehen bei Design durch AI</a:t>
-            </a:r>
-          </a:p>
-          <a:p>
-            <a:pPr lvl="0"/>
-            <a:r>
-              <a:rPr/>
-              <a:t>KI-gestützte Entwicklung mit Junie (IDE-zentriert)</a:t>
-            </a:r>
-          </a:p>
-          <a:p>
-            <a:pPr lvl="0"/>
-            <a:r>
-              <a:rPr/>
-              <a:t>ChatGPT (extern &amp; beratend)</a:t>
-            </a:r>
-          </a:p>
-          <a:p>
-            <a:pPr lvl="0"/>
-            <a:r>
-              <a:rPr/>
-              <a:t>Einschränkungen im Firmenumfeld</a:t>
+              <a:rPr b="1"/>
+              <a:t>Einordnung</a:t>
+            </a:r>
+          </a:p>
+          <a:p>
+            <a:pPr lvl="1"/>
+            <a:r>
+              <a:t>Fazit &amp; Ausblick</a:t>
             </a:r>
           </a:p>
         </p:txBody>
       </p:sp>
     </p:spTree>
   </p:cSld>
+  <p:clrMapOvr>
+    <a:masterClrMapping/>
+  </p:clrMapOvr>
 </p:sld>
 </file>
 
@@ -6466,7 +7366,7 @@
           <p:cNvPr id="2" name="Title 1">
             <a:extLst>
               <a:ext uri="{FF2B5EF4-FFF2-40B4-BE49-F238E27FC236}">
-                <a16:creationId xmlns:a16="http://schemas.microsoft.com/office/drawing/2014/main" id="{8676017A-D490-C525-5E87-B6C1AF2B5EEE}"/>
+                <a16:creationId xmlns:a16="http://schemas.microsoft.com/office/drawing/2014/main" id="{DD0E9A73-1ED0-3410-F8C0-EF5D675D2DF9}"/>
               </a:ext>
             </a:extLst>
           </p:cNvPr>
@@ -6482,142 +7382,10 @@
           <a:bodyPr/>
           <a:lstStyle/>
           <a:p>
-            <a:pPr lvl="0" indent="0" marL="0">
-              <a:buNone/>
-            </a:pPr>
-            <a:r>
-              <a:rPr/>
-              <a:t>Agenda</a:t>
-            </a:r>
-          </a:p>
-        </p:txBody>
-      </p:sp>
-      <p:sp>
-        <p:nvSpPr>
-          <p:cNvPr id="3" name="Content Placeholder 2">
-            <a:extLst>
-              <a:ext uri="{FF2B5EF4-FFF2-40B4-BE49-F238E27FC236}">
-                <a16:creationId xmlns:a16="http://schemas.microsoft.com/office/drawing/2014/main" id="{8474243A-9EC3-DC90-DD30-786D6071319D}"/>
-              </a:ext>
-            </a:extLst>
-          </p:cNvPr>
-          <p:cNvSpPr>
-            <a:spLocks noGrp="1"/>
-          </p:cNvSpPr>
-          <p:nvPr>
-            <p:ph idx="1"/>
-          </p:nvPr>
-        </p:nvSpPr>
-        <p:spPr/>
-        <p:txBody>
-          <a:bodyPr/>
-          <a:lstStyle/>
-          <a:p>
-            <a:pPr lvl="0"/>
-            <a:r>
-              <a:rPr b="1"/>
-              <a:t>Demo &amp; Kontext</a:t>
-            </a:r>
-          </a:p>
-          <a:p>
-            <a:pPr lvl="1"/>
-            <a:r>
-              <a:rPr/>
-              <a:t>Angular Web &amp; Android App</a:t>
-            </a:r>
-          </a:p>
-          <a:p>
-            <a:pPr lvl="0"/>
-            <a:r>
-              <a:rPr b="1"/>
-              <a:t>AI-Werkzeuge</a:t>
-            </a:r>
-          </a:p>
-          <a:p>
-            <a:pPr lvl="1"/>
-            <a:r>
-              <a:rPr/>
-              <a:t>Junie AI, ChatGPT</a:t>
-            </a:r>
-          </a:p>
-          <a:p>
-            <a:pPr lvl="0"/>
-            <a:r>
-              <a:rPr b="1"/>
-              <a:t>Praxis</a:t>
-            </a:r>
-          </a:p>
-          <a:p>
-            <a:pPr lvl="1"/>
-            <a:r>
-              <a:rPr/>
-              <a:t>Vorgehensweise &amp; Beispiele</a:t>
-            </a:r>
-          </a:p>
-          <a:p>
-            <a:pPr lvl="0"/>
-            <a:r>
-              <a:rPr b="1"/>
-              <a:t>Einordnung</a:t>
-            </a:r>
-          </a:p>
-          <a:p>
-            <a:pPr lvl="1"/>
-            <a:r>
-              <a:rPr/>
-              <a:t>Fazit &amp; Ausblick</a:t>
-            </a:r>
-          </a:p>
-        </p:txBody>
-      </p:sp>
-    </p:spTree>
-  </p:cSld>
-</p:sld>
-</file>
-
-<file path=ppt/slides/slide4.xml><?xml version="1.0" encoding="utf-8"?>
-<p:sld xmlns:a="http://schemas.openxmlformats.org/drawingml/2006/main" xmlns:r="http://schemas.openxmlformats.org/officeDocument/2006/relationships" xmlns:p="http://schemas.openxmlformats.org/presentationml/2006/main">
-  <p:cSld>
-    <p:spTree>
-      <p:nvGrpSpPr>
-        <p:cNvPr id="1" name=""/>
-        <p:cNvGrpSpPr/>
-        <p:nvPr/>
-      </p:nvGrpSpPr>
-      <p:grpSpPr>
-        <a:xfrm>
-          <a:off x="0" y="0"/>
-          <a:ext cx="0" cy="0"/>
-          <a:chOff x="0" y="0"/>
-          <a:chExt cx="0" cy="0"/>
-        </a:xfrm>
-      </p:grpSpPr>
-      <p:sp>
-        <p:nvSpPr>
-          <p:cNvPr id="2" name="Title 1">
-            <a:extLst>
-              <a:ext uri="{FF2B5EF4-FFF2-40B4-BE49-F238E27FC236}">
-                <a16:creationId xmlns:a16="http://schemas.microsoft.com/office/drawing/2014/main" id="{DD0E9A73-1ED0-3410-F8C0-EF5D675D2DF9}"/>
-              </a:ext>
-            </a:extLst>
-          </p:cNvPr>
-          <p:cNvSpPr>
-            <a:spLocks noGrp="1"/>
-          </p:cNvSpPr>
-          <p:nvPr>
-            <p:ph type="title"/>
-          </p:nvPr>
-        </p:nvSpPr>
-        <p:spPr/>
-        <p:txBody>
-          <a:bodyPr/>
-          <a:lstStyle/>
-          <a:p>
-            <a:pPr lvl="0" indent="0" marL="0">
-              <a:buNone/>
-            </a:pPr>
-            <a:r>
-              <a:rPr/>
+            <a:pPr marL="0" lvl="0" indent="0">
+              <a:buNone/>
+            </a:pPr>
+            <a:r>
               <a:t>Anwendungsübersicht</a:t>
             </a:r>
           </a:p>
@@ -6625,14 +7393,14 @@
       </p:sp>
       <p:pic>
         <p:nvPicPr>
-          <p:cNvPr descr="files/images/angular_task_menu.png" id="0" name="Picture 1"/>
+          <p:cNvPr id="3" name="Picture 1" descr="files/images/angular_task_menu.png"/>
           <p:cNvPicPr>
             <a:picLocks noGrp="1" noChangeAspect="1"/>
           </p:cNvPicPr>
           <p:nvPr/>
         </p:nvPicPr>
         <p:blipFill>
-          <a:blip r:embed="rId2"/>
+          <a:blip r:embed="rId3"/>
           <a:stretch>
             <a:fillRect/>
           </a:stretch>
@@ -6655,14 +7423,14 @@
       </p:pic>
       <p:pic>
         <p:nvPicPr>
-          <p:cNvPr descr="files/images/android_task_menu.png" id="0" name="Picture 1"/>
+          <p:cNvPr id="4" name="Picture 1" descr="files/images/android_task_menu.png"/>
           <p:cNvPicPr>
             <a:picLocks noGrp="1" noChangeAspect="1"/>
           </p:cNvPicPr>
           <p:nvPr/>
         </p:nvPicPr>
         <p:blipFill>
-          <a:blip r:embed="rId3"/>
+          <a:blip r:embed="rId4"/>
           <a:stretch>
             <a:fillRect/>
           </a:stretch>
@@ -6685,6 +7453,94 @@
       </p:pic>
     </p:spTree>
   </p:cSld>
+  <p:clrMapOvr>
+    <a:masterClrMapping/>
+  </p:clrMapOvr>
+</p:sld>
+</file>
+
+<file path=ppt/slides/slide4.xml><?xml version="1.0" encoding="utf-8"?>
+<p:sld xmlns:a="http://schemas.openxmlformats.org/drawingml/2006/main" xmlns:r="http://schemas.openxmlformats.org/officeDocument/2006/relationships" xmlns:p="http://schemas.openxmlformats.org/presentationml/2006/main">
+  <p:cSld>
+    <p:spTree>
+      <p:nvGrpSpPr>
+        <p:cNvPr id="1" name=""/>
+        <p:cNvGrpSpPr/>
+        <p:nvPr/>
+      </p:nvGrpSpPr>
+      <p:grpSpPr>
+        <a:xfrm>
+          <a:off x="0" y="0"/>
+          <a:ext cx="0" cy="0"/>
+          <a:chOff x="0" y="0"/>
+          <a:chExt cx="0" cy="0"/>
+        </a:xfrm>
+      </p:grpSpPr>
+      <p:sp>
+        <p:nvSpPr>
+          <p:cNvPr id="2" name="Title 1">
+            <a:extLst>
+              <a:ext uri="{FF2B5EF4-FFF2-40B4-BE49-F238E27FC236}">
+                <a16:creationId xmlns:a16="http://schemas.microsoft.com/office/drawing/2014/main" id="{8676017A-D490-C525-5E87-B6C1AF2B5EEE}"/>
+              </a:ext>
+            </a:extLst>
+          </p:cNvPr>
+          <p:cNvSpPr>
+            <a:spLocks noGrp="1"/>
+          </p:cNvSpPr>
+          <p:nvPr>
+            <p:ph type="title"/>
+          </p:nvPr>
+        </p:nvSpPr>
+        <p:spPr/>
+        <p:txBody>
+          <a:bodyPr/>
+          <a:lstStyle/>
+          <a:p>
+            <a:pPr marL="0" lvl="0" indent="0">
+              <a:buNone/>
+            </a:pPr>
+            <a:r>
+              <a:t>Architekturübersicht – Infrastruktur</a:t>
+            </a:r>
+          </a:p>
+        </p:txBody>
+      </p:sp>
+      <p:pic>
+        <p:nvPicPr>
+          <p:cNvPr id="3" name="Picture 1" descr="files/generated/architecture_overview.png"/>
+          <p:cNvPicPr>
+            <a:picLocks noGrp="1" noChangeAspect="1"/>
+          </p:cNvPicPr>
+          <p:nvPr/>
+        </p:nvPicPr>
+        <p:blipFill>
+          <a:blip r:embed="rId2"/>
+          <a:stretch>
+            <a:fillRect/>
+          </a:stretch>
+        </p:blipFill>
+        <p:spPr bwMode="auto">
+          <a:xfrm>
+            <a:off x="3441700" y="1816100"/>
+            <a:ext cx="5308600" cy="4343400"/>
+          </a:xfrm>
+          <a:prstGeom prst="rect">
+            <a:avLst/>
+          </a:prstGeom>
+          <a:noFill/>
+          <a:ln w="9525">
+            <a:noFill/>
+            <a:headEnd/>
+            <a:tailEnd/>
+          </a:ln>
+        </p:spPr>
+      </p:pic>
+    </p:spTree>
+  </p:cSld>
+  <p:clrMapOvr>
+    <a:masterClrMapping/>
+  </p:clrMapOvr>
 </p:sld>
 </file>
 
@@ -6726,103 +7582,50 @@
           <a:bodyPr/>
           <a:lstStyle/>
           <a:p>
-            <a:pPr lvl="0" indent="0" marL="0">
-              <a:buNone/>
-            </a:pPr>
-            <a:r>
-              <a:rPr/>
-              <a:t>Architekturübersicht – Logisch</a:t>
-            </a:r>
-          </a:p>
-        </p:txBody>
-      </p:sp>
-      <p:sp>
-        <p:nvSpPr>
-          <p:cNvPr id="3" name="Content Placeholder 2">
-            <a:extLst>
-              <a:ext uri="{FF2B5EF4-FFF2-40B4-BE49-F238E27FC236}">
-                <a16:creationId xmlns:a16="http://schemas.microsoft.com/office/drawing/2014/main" id="{8474243A-9EC3-DC90-DD30-786D6071319D}"/>
-              </a:ext>
-            </a:extLst>
-          </p:cNvPr>
-          <p:cNvSpPr>
-            <a:spLocks noGrp="1"/>
-          </p:cNvSpPr>
-          <p:nvPr>
-            <p:ph idx="1"/>
-          </p:nvPr>
-        </p:nvSpPr>
-        <p:spPr/>
-        <p:txBody>
-          <a:bodyPr/>
-          <a:lstStyle/>
-          <a:p>
-            <a:pPr lvl="0"/>
-            <a:r>
-              <a:rPr b="1"/>
-              <a:t>Clients</a:t>
-            </a:r>
-          </a:p>
-          <a:p>
-            <a:pPr lvl="1"/>
-            <a:r>
-              <a:rPr/>
-              <a:t>Angular Web-UI</a:t>
-            </a:r>
-          </a:p>
-          <a:p>
-            <a:pPr lvl="1"/>
-            <a:r>
-              <a:rPr/>
-              <a:t>Android App (Jetpack Compose)</a:t>
-            </a:r>
-          </a:p>
-          <a:p>
-            <a:pPr lvl="1"/>
-            <a:r>
-              <a:rPr/>
-              <a:t>Test-Daten-Generator</a:t>
-            </a:r>
-          </a:p>
-          <a:p>
-            <a:pPr lvl="0"/>
-            <a:r>
-              <a:rPr b="1"/>
-              <a:t>Backend</a:t>
-            </a:r>
-          </a:p>
-          <a:p>
-            <a:pPr lvl="1"/>
-            <a:r>
-              <a:rPr/>
-              <a:t>Java, Spring Boot REST-API</a:t>
-            </a:r>
-          </a:p>
-          <a:p>
-            <a:pPr lvl="0"/>
-            <a:r>
-              <a:rPr b="1"/>
-              <a:t>Persistenz</a:t>
-            </a:r>
-          </a:p>
-          <a:p>
-            <a:pPr lvl="1"/>
-            <a:r>
-              <a:rPr/>
-              <a:t>PostgreSQL (AWS RDS)</a:t>
-            </a:r>
-          </a:p>
-          <a:p>
-            <a:pPr lvl="1"/>
-            <a:r>
-              <a:rPr/>
-              <a:t>Lokal: H2</a:t>
-            </a:r>
-          </a:p>
-        </p:txBody>
-      </p:sp>
+            <a:pPr marL="0" lvl="0" indent="0">
+              <a:buNone/>
+            </a:pPr>
+            <a:r>
+              <a:t>AI unterstützte Entwicklung</a:t>
+            </a:r>
+          </a:p>
+        </p:txBody>
+      </p:sp>
+      <p:pic>
+        <p:nvPicPr>
+          <p:cNvPr id="3" name="Picture 1" descr="files/images/IdeIntegration.png"/>
+          <p:cNvPicPr>
+            <a:picLocks noGrp="1" noChangeAspect="1"/>
+          </p:cNvPicPr>
+          <p:nvPr/>
+        </p:nvPicPr>
+        <p:blipFill>
+          <a:blip r:embed="rId2"/>
+          <a:stretch>
+            <a:fillRect/>
+          </a:stretch>
+        </p:blipFill>
+        <p:spPr bwMode="auto">
+          <a:xfrm>
+            <a:off x="2463800" y="1816100"/>
+            <a:ext cx="7277100" cy="4343400"/>
+          </a:xfrm>
+          <a:prstGeom prst="rect">
+            <a:avLst/>
+          </a:prstGeom>
+          <a:noFill/>
+          <a:ln w="9525">
+            <a:noFill/>
+            <a:headEnd/>
+            <a:tailEnd/>
+          </a:ln>
+        </p:spPr>
+      </p:pic>
     </p:spTree>
   </p:cSld>
+  <p:clrMapOvr>
+    <a:masterClrMapping/>
+  </p:clrMapOvr>
 </p:sld>
 </file>
 
@@ -6864,48 +7667,99 @@
           <a:bodyPr/>
           <a:lstStyle/>
           <a:p>
-            <a:pPr lvl="0" indent="0" marL="0">
-              <a:buNone/>
-            </a:pPr>
-            <a:r>
-              <a:rPr/>
-              <a:t>Architekturübersicht – Infrastruktur</a:t>
-            </a:r>
-          </a:p>
-        </p:txBody>
-      </p:sp>
-      <p:pic>
-        <p:nvPicPr>
-          <p:cNvPr descr="files/generated/architecture_overview.png" id="0" name="Picture 1"/>
-          <p:cNvPicPr>
-            <a:picLocks noGrp="1" noChangeAspect="1"/>
-          </p:cNvPicPr>
-          <p:nvPr/>
-        </p:nvPicPr>
-        <p:blipFill>
-          <a:blip r:embed="rId2"/>
-          <a:stretch>
-            <a:fillRect/>
-          </a:stretch>
-        </p:blipFill>
-        <p:spPr bwMode="auto">
-          <a:xfrm>
-            <a:off x="3187700" y="1816100"/>
-            <a:ext cx="5829300" cy="4343400"/>
-          </a:xfrm>
-          <a:prstGeom prst="rect">
-            <a:avLst/>
-          </a:prstGeom>
-          <a:noFill/>
-          <a:ln w="9525">
-            <a:noFill/>
-            <a:headEnd/>
-            <a:tailEnd/>
-          </a:ln>
-        </p:spPr>
-      </p:pic>
+            <a:pPr marL="0" lvl="0" indent="0">
+              <a:buNone/>
+            </a:pPr>
+            <a:r>
+              <a:t>Architekturübersicht – Logisch</a:t>
+            </a:r>
+          </a:p>
+        </p:txBody>
+      </p:sp>
+      <p:sp>
+        <p:nvSpPr>
+          <p:cNvPr id="3" name="Content Placeholder 2">
+            <a:extLst>
+              <a:ext uri="{FF2B5EF4-FFF2-40B4-BE49-F238E27FC236}">
+                <a16:creationId xmlns:a16="http://schemas.microsoft.com/office/drawing/2014/main" id="{8474243A-9EC3-DC90-DD30-786D6071319D}"/>
+              </a:ext>
+            </a:extLst>
+          </p:cNvPr>
+          <p:cNvSpPr>
+            <a:spLocks noGrp="1"/>
+          </p:cNvSpPr>
+          <p:nvPr>
+            <p:ph idx="1"/>
+          </p:nvPr>
+        </p:nvSpPr>
+        <p:spPr/>
+        <p:txBody>
+          <a:bodyPr/>
+          <a:lstStyle/>
+          <a:p>
+            <a:pPr lvl="0"/>
+            <a:r>
+              <a:rPr b="1"/>
+              <a:t>Clients</a:t>
+            </a:r>
+          </a:p>
+          <a:p>
+            <a:pPr lvl="1"/>
+            <a:r>
+              <a:t>Angular Web-UI</a:t>
+            </a:r>
+          </a:p>
+          <a:p>
+            <a:pPr lvl="1"/>
+            <a:r>
+              <a:t>Android App (Jetpack Compose)</a:t>
+            </a:r>
+          </a:p>
+          <a:p>
+            <a:pPr lvl="1"/>
+            <a:r>
+              <a:t>Test-Daten-Generator</a:t>
+            </a:r>
+          </a:p>
+          <a:p>
+            <a:pPr lvl="0"/>
+            <a:r>
+              <a:rPr b="1"/>
+              <a:t>Backend</a:t>
+            </a:r>
+          </a:p>
+          <a:p>
+            <a:pPr lvl="1"/>
+            <a:r>
+              <a:t>Java, Spring Boot REST-API</a:t>
+            </a:r>
+          </a:p>
+          <a:p>
+            <a:pPr lvl="0"/>
+            <a:r>
+              <a:rPr b="1"/>
+              <a:t>Persistenz</a:t>
+            </a:r>
+          </a:p>
+          <a:p>
+            <a:pPr lvl="1"/>
+            <a:r>
+              <a:t>PostgreSQL (AWS RDS)</a:t>
+            </a:r>
+          </a:p>
+          <a:p>
+            <a:pPr lvl="1"/>
+            <a:r>
+              <a:t>Lokal: H2</a:t>
+            </a:r>
+          </a:p>
+        </p:txBody>
+      </p:sp>
     </p:spTree>
   </p:cSld>
+  <p:clrMapOvr>
+    <a:masterClrMapping/>
+  </p:clrMapOvr>
 </p:sld>
 </file>
 
@@ -6928,18 +7782,18 @@
       </p:grpSpPr>
       <p:sp>
         <p:nvSpPr>
-          <p:cNvPr id="3" name="Content Placeholder 2">
-            <a:extLst>
-              <a:ext uri="{FF2B5EF4-FFF2-40B4-BE49-F238E27FC236}">
-                <a16:creationId xmlns:a16="http://schemas.microsoft.com/office/drawing/2014/main" id="{8474243A-9EC3-DC90-DD30-786D6071319D}"/>
-              </a:ext>
-            </a:extLst>
-          </p:cNvPr>
-          <p:cNvSpPr>
-            <a:spLocks noGrp="1"/>
-          </p:cNvSpPr>
-          <p:nvPr>
-            <p:ph idx="1"/>
+          <p:cNvPr id="2" name="Title 1">
+            <a:extLst>
+              <a:ext uri="{FF2B5EF4-FFF2-40B4-BE49-F238E27FC236}">
+                <a16:creationId xmlns:a16="http://schemas.microsoft.com/office/drawing/2014/main" id="{8676017A-D490-C525-5E87-B6C1AF2B5EEE}"/>
+              </a:ext>
+            </a:extLst>
+          </p:cNvPr>
+          <p:cNvSpPr>
+            <a:spLocks noGrp="1"/>
+          </p:cNvSpPr>
+          <p:nvPr>
+            <p:ph type="title"/>
           </p:nvPr>
         </p:nvSpPr>
         <p:spPr/>
@@ -6947,23 +7801,81 @@
           <a:bodyPr/>
           <a:lstStyle/>
           <a:p>
+            <a:pPr marL="0" lvl="0" indent="0">
+              <a:buNone/>
+            </a:pPr>
+            <a:r>
+              <a:t>AI Toolset</a:t>
+            </a:r>
+          </a:p>
+        </p:txBody>
+      </p:sp>
+      <p:sp>
+        <p:nvSpPr>
+          <p:cNvPr id="3" name="Content Placeholder 2">
+            <a:extLst>
+              <a:ext uri="{FF2B5EF4-FFF2-40B4-BE49-F238E27FC236}">
+                <a16:creationId xmlns:a16="http://schemas.microsoft.com/office/drawing/2014/main" id="{8474243A-9EC3-DC90-DD30-786D6071319D}"/>
+              </a:ext>
+            </a:extLst>
+          </p:cNvPr>
+          <p:cNvSpPr>
+            <a:spLocks noGrp="1"/>
+          </p:cNvSpPr>
+          <p:nvPr>
+            <p:ph idx="1"/>
+          </p:nvPr>
+        </p:nvSpPr>
+        <p:spPr/>
+        <p:txBody>
+          <a:bodyPr/>
+          <a:lstStyle/>
+          <a:p>
             <a:pPr lvl="0"/>
             <a:r>
-              <a:rPr/>
-              <a:t>Docker Container</a:t>
+              <a:rPr b="1"/>
+              <a:t>Junie AI (JetBrains)</a:t>
+            </a:r>
+          </a:p>
+          <a:p>
+            <a:pPr lvl="1"/>
+            <a:r>
+              <a:t>Code-Generierung, Refactoring, Tests</a:t>
             </a:r>
           </a:p>
           <a:p>
             <a:pPr lvl="0"/>
             <a:r>
-              <a:rPr/>
-              <a:t>AWS ECS Fargate</a:t>
+              <a:rPr b="1"/>
+              <a:t>ChatGPT (OpenAI)</a:t>
+            </a:r>
+          </a:p>
+          <a:p>
+            <a:pPr lvl="1"/>
+            <a:r>
+              <a:t>UX-Design, Architektur-Reviews, Konzeptarbeit</a:t>
+            </a:r>
+          </a:p>
+          <a:p>
+            <a:pPr lvl="0"/>
+            <a:r>
+              <a:rPr b="1"/>
+              <a:t>IDE-Integration</a:t>
+            </a:r>
+          </a:p>
+          <a:p>
+            <a:pPr lvl="1"/>
+            <a:r>
+              <a:t>IntelliJ IDEA, Android Studio</a:t>
             </a:r>
           </a:p>
         </p:txBody>
       </p:sp>
     </p:spTree>
   </p:cSld>
+  <p:clrMapOvr>
+    <a:masterClrMapping/>
+  </p:clrMapOvr>
 </p:sld>
 </file>
 
@@ -7005,12 +7917,11 @@
           <a:bodyPr/>
           <a:lstStyle/>
           <a:p>
-            <a:pPr lvl="0" indent="0" marL="0">
-              <a:buNone/>
-            </a:pPr>
-            <a:r>
-              <a:rPr/>
-              <a:t>AI Toolset</a:t>
+            <a:pPr marL="0" lvl="0" indent="0">
+              <a:buNone/>
+            </a:pPr>
+            <a:r>
+              <a:t>Vorgehen bei Design durch AI</a:t>
             </a:r>
           </a:p>
         </p:txBody>
@@ -7033,54 +7944,177 @@
         </p:nvSpPr>
         <p:spPr/>
         <p:txBody>
-          <a:bodyPr/>
+          <a:bodyPr>
+            <a:normAutofit fontScale="92500" lnSpcReduction="20000"/>
+          </a:bodyPr>
           <a:lstStyle/>
           <a:p>
-            <a:pPr lvl="0"/>
-            <a:r>
-              <a:rPr b="1"/>
-              <a:t>Junie AI (JetBrains)</a:t>
+            <a:pPr marL="457200" lvl="0" indent="-457200">
+              <a:buAutoNum type="arabicPeriod"/>
+            </a:pPr>
+            <a:r>
+              <a:rPr b="1" dirty="0"/>
+              <a:t>Prompting</a:t>
             </a:r>
           </a:p>
           <a:p>
             <a:pPr lvl="1"/>
             <a:r>
-              <a:rPr/>
-              <a:t>Code-Generierung, Refactoring, Tests</a:t>
-            </a:r>
-          </a:p>
-          <a:p>
-            <a:pPr lvl="0"/>
-            <a:r>
-              <a:rPr b="1"/>
-              <a:t>ChatGPT (OpenAI)</a:t>
-            </a:r>
+              <a:rPr dirty="0"/>
+              <a:t>Ziel und </a:t>
+            </a:r>
+            <a:r>
+              <a:rPr dirty="0" err="1"/>
+              <a:t>Kontext</a:t>
+            </a:r>
+            <a:r>
+              <a:rPr dirty="0"/>
+              <a:t> </a:t>
+            </a:r>
+            <a:r>
+              <a:rPr dirty="0" err="1"/>
+              <a:t>definieren</a:t>
+            </a:r>
+            <a:endParaRPr dirty="0"/>
+          </a:p>
+          <a:p>
+            <a:pPr marL="457200" lvl="0" indent="-457200">
+              <a:buAutoNum type="arabicPeriod"/>
+            </a:pPr>
+            <a:r>
+              <a:rPr b="1" dirty="0" err="1"/>
+              <a:t>Struktur</a:t>
+            </a:r>
+            <a:endParaRPr b="1" dirty="0"/>
           </a:p>
           <a:p>
             <a:pPr lvl="1"/>
             <a:r>
-              <a:rPr/>
-              <a:t>UX-Design, Architektur-Reviews, Konzeptarbeit</a:t>
-            </a:r>
-          </a:p>
-          <a:p>
-            <a:pPr lvl="0"/>
-            <a:r>
-              <a:rPr b="1"/>
-              <a:t>IDE-Integration</a:t>
-            </a:r>
+              <a:rPr dirty="0" err="1"/>
+              <a:t>Entitäten</a:t>
+            </a:r>
+            <a:r>
+              <a:rPr dirty="0"/>
+              <a:t>, Attribute, </a:t>
+            </a:r>
+            <a:r>
+              <a:rPr dirty="0" err="1"/>
+              <a:t>Menüs</a:t>
+            </a:r>
+            <a:endParaRPr dirty="0"/>
+          </a:p>
+          <a:p>
+            <a:pPr marL="457200" lvl="0" indent="-457200">
+              <a:buAutoNum type="arabicPeriod"/>
+            </a:pPr>
+            <a:r>
+              <a:rPr b="1" dirty="0" err="1"/>
+              <a:t>Planung</a:t>
+            </a:r>
+            <a:endParaRPr b="1" dirty="0"/>
           </a:p>
           <a:p>
             <a:pPr lvl="1"/>
             <a:r>
-              <a:rPr/>
-              <a:t>IntelliJ IDEA, Android Studio</a:t>
-            </a:r>
+              <a:rPr dirty="0" err="1"/>
+              <a:t>Detaillierter</a:t>
+            </a:r>
+            <a:r>
+              <a:rPr dirty="0"/>
+              <a:t> Markdown-Plan</a:t>
+            </a:r>
+          </a:p>
+          <a:p>
+            <a:pPr marL="457200" lvl="0" indent="-457200">
+              <a:buAutoNum type="arabicPeriod"/>
+            </a:pPr>
+            <a:r>
+              <a:rPr b="1" dirty="0"/>
+              <a:t>Review</a:t>
+            </a:r>
+          </a:p>
+          <a:p>
+            <a:pPr lvl="1"/>
+            <a:r>
+              <a:rPr dirty="0"/>
+              <a:t>Entwickler </a:t>
+            </a:r>
+            <a:r>
+              <a:rPr dirty="0" err="1"/>
+              <a:t>prüft</a:t>
+            </a:r>
+            <a:r>
+              <a:rPr dirty="0"/>
+              <a:t> &amp; </a:t>
+            </a:r>
+            <a:r>
+              <a:rPr dirty="0" err="1"/>
+              <a:t>ergänzt</a:t>
+            </a:r>
+            <a:endParaRPr dirty="0"/>
+          </a:p>
+          <a:p>
+            <a:pPr marL="457200" lvl="0" indent="-457200">
+              <a:buAutoNum type="arabicPeriod"/>
+            </a:pPr>
+            <a:r>
+              <a:rPr b="1" dirty="0" err="1"/>
+              <a:t>Implementierung</a:t>
+            </a:r>
+            <a:endParaRPr b="1" dirty="0"/>
+          </a:p>
+          <a:p>
+            <a:pPr lvl="1"/>
+            <a:r>
+              <a:rPr dirty="0"/>
+              <a:t>Code + Tests </a:t>
+            </a:r>
+            <a:r>
+              <a:rPr dirty="0" err="1"/>
+              <a:t>durch</a:t>
+            </a:r>
+            <a:r>
+              <a:rPr dirty="0"/>
+              <a:t> AI</a:t>
+            </a:r>
+          </a:p>
+          <a:p>
+            <a:pPr marL="457200" lvl="0" indent="-457200">
+              <a:buAutoNum type="arabicPeriod"/>
+            </a:pPr>
+            <a:r>
+              <a:rPr b="1" dirty="0" err="1"/>
+              <a:t>Qualität</a:t>
+            </a:r>
+            <a:endParaRPr b="1" dirty="0"/>
+          </a:p>
+          <a:p>
+            <a:pPr lvl="1"/>
+            <a:r>
+              <a:rPr dirty="0"/>
+              <a:t>Entwickler </a:t>
+            </a:r>
+            <a:r>
+              <a:rPr dirty="0" err="1"/>
+              <a:t>bleibt</a:t>
+            </a:r>
+            <a:r>
+              <a:rPr dirty="0"/>
+              <a:t> </a:t>
+            </a:r>
+            <a:r>
+              <a:rPr dirty="0" err="1"/>
+              <a:t>verantwortlich</a:t>
+            </a:r>
+            <a:endParaRPr dirty="0"/>
           </a:p>
         </p:txBody>
       </p:sp>
     </p:spTree>
   </p:cSld>
+  <p:clrMapOvr>
+    <a:masterClrMapping/>
+  </p:clrMapOvr>
 </p:sld>
 </file>
 
@@ -7122,12 +8156,11 @@
           <a:bodyPr/>
           <a:lstStyle/>
           <a:p>
-            <a:pPr lvl="0" indent="0" marL="0">
-              <a:buNone/>
-            </a:pPr>
-            <a:r>
-              <a:rPr/>
-              <a:t>Vorgehen bei Design durch AI</a:t>
+            <a:pPr marL="0" lvl="0" indent="0">
+              <a:buNone/>
+            </a:pPr>
+            <a:r>
+              <a:t>KI-gestützt mit Junie (IDE-zentriert)</a:t>
             </a:r>
           </a:p>
         </p:txBody>
@@ -7153,105 +8186,36 @@
           <a:bodyPr/>
           <a:lstStyle/>
           <a:p>
-            <a:pPr lvl="0" indent="-457200" marL="457200">
-              <a:buAutoNum type="arabicPeriod"/>
-            </a:pPr>
-            <a:r>
-              <a:rPr b="1"/>
-              <a:t>Prompting</a:t>
-            </a:r>
-          </a:p>
-          <a:p>
-            <a:pPr lvl="1"/>
-            <a:r>
-              <a:rPr/>
-              <a:t>Ziel und Kontext definieren</a:t>
-            </a:r>
-          </a:p>
-          <a:p>
-            <a:pPr lvl="0" indent="-457200" marL="457200">
-              <a:buAutoNum type="arabicPeriod"/>
-            </a:pPr>
-            <a:r>
-              <a:rPr b="1"/>
-              <a:t>Struktur</a:t>
-            </a:r>
-          </a:p>
-          <a:p>
-            <a:pPr lvl="1"/>
-            <a:r>
-              <a:rPr/>
-              <a:t>Entitäten, Attribute, Menüs</a:t>
-            </a:r>
-          </a:p>
-          <a:p>
-            <a:pPr lvl="0" indent="-457200" marL="457200">
-              <a:buAutoNum type="arabicPeriod"/>
-            </a:pPr>
-            <a:r>
-              <a:rPr b="1"/>
-              <a:t>Planung</a:t>
-            </a:r>
-          </a:p>
-          <a:p>
-            <a:pPr lvl="1"/>
-            <a:r>
-              <a:rPr/>
-              <a:t>Detaillierter Markdown-Plan</a:t>
-            </a:r>
-          </a:p>
-          <a:p>
-            <a:pPr lvl="0" indent="-457200" marL="457200">
-              <a:buAutoNum type="arabicPeriod"/>
-            </a:pPr>
-            <a:r>
-              <a:rPr b="1"/>
-              <a:t>Review</a:t>
-            </a:r>
-          </a:p>
-          <a:p>
-            <a:pPr lvl="1"/>
-            <a:r>
-              <a:rPr/>
-              <a:t>Entwickler prüft &amp; ergänzt</a:t>
-            </a:r>
-          </a:p>
-          <a:p>
-            <a:pPr lvl="0" indent="-457200" marL="457200">
-              <a:buAutoNum type="arabicPeriod"/>
-            </a:pPr>
-            <a:r>
-              <a:rPr b="1"/>
-              <a:t>Implementierung</a:t>
-            </a:r>
-          </a:p>
-          <a:p>
-            <a:pPr lvl="1"/>
-            <a:r>
-              <a:rPr/>
-              <a:t>Code + Tests durch AI</a:t>
-            </a:r>
-          </a:p>
-          <a:p>
-            <a:pPr lvl="0" indent="-457200" marL="457200">
-              <a:buAutoNum type="arabicPeriod"/>
-            </a:pPr>
-            <a:r>
-              <a:rPr b="1"/>
-              <a:t>Qualität</a:t>
-            </a:r>
-          </a:p>
-          <a:p>
-            <a:pPr lvl="1"/>
-            <a:r>
-              <a:rPr/>
-              <a:t>Entwickler bleibt verantwortlich</a:t>
+            <a:pPr lvl="0"/>
+            <a:r>
+              <a:t>Direkte IDE-Integration</a:t>
+            </a:r>
+          </a:p>
+          <a:p>
+            <a:pPr lvl="0"/>
+            <a:r>
+              <a:t>Kontext aus Projekt &amp; Code</a:t>
+            </a:r>
+          </a:p>
+          <a:p>
+            <a:pPr lvl="0"/>
+            <a:r>
+              <a:t>Schnelle Iterationen</a:t>
+            </a:r>
+          </a:p>
+          <a:p>
+            <a:pPr lvl="0"/>
+            <a:r>
+              <a:t>Fokus auf Implementierung</a:t>
             </a:r>
           </a:p>
         </p:txBody>
       </p:sp>
     </p:spTree>
   </p:cSld>
+  <p:clrMapOvr>
+    <a:masterClrMapping/>
+  </p:clrMapOvr>
 </p:sld>
 </file>
 

</xml_diff>